<commit_message>
add mq2 and buzzer ppt
</commit_message>
<xml_diff>
--- a/hand-held_environment_monitor_Template.pptx
+++ b/hand-held_environment_monitor_Template.pptx
@@ -8,10 +8,10 @@
     <p:sldMasterId id="2147483699" r:id="rId4"/>
   </p:sldMasterIdLst>
   <p:notesMasterIdLst>
-    <p:notesMasterId r:id="rId25"/>
+    <p:notesMasterId r:id="rId26"/>
   </p:notesMasterIdLst>
   <p:handoutMasterIdLst>
-    <p:handoutMasterId r:id="rId26"/>
+    <p:handoutMasterId r:id="rId27"/>
   </p:handoutMasterIdLst>
   <p:sldIdLst>
     <p:sldId id="256" r:id="rId5"/>
@@ -27,13 +27,14 @@
     <p:sldId id="270" r:id="rId15"/>
     <p:sldId id="278" r:id="rId16"/>
     <p:sldId id="280" r:id="rId17"/>
-    <p:sldId id="273" r:id="rId18"/>
-    <p:sldId id="274" r:id="rId19"/>
-    <p:sldId id="279" r:id="rId20"/>
-    <p:sldId id="276" r:id="rId21"/>
-    <p:sldId id="277" r:id="rId22"/>
-    <p:sldId id="265" r:id="rId23"/>
-    <p:sldId id="261" r:id="rId24"/>
+    <p:sldId id="281" r:id="rId18"/>
+    <p:sldId id="282" r:id="rId19"/>
+    <p:sldId id="274" r:id="rId20"/>
+    <p:sldId id="279" r:id="rId21"/>
+    <p:sldId id="276" r:id="rId22"/>
+    <p:sldId id="277" r:id="rId23"/>
+    <p:sldId id="265" r:id="rId24"/>
+    <p:sldId id="261" r:id="rId25"/>
   </p:sldIdLst>
   <p:sldSz cx="9144000" cy="5143500" type="screen16x9"/>
   <p:notesSz cx="6858000" cy="9144000"/>
@@ -134,7 +135,7 @@
   </p:defaultTextStyle>
   <p:extLst>
     <p:ext uri="{EFAFB233-063F-42B5-8137-9DF3F51BA10A}">
-      <p15:sldGuideLst xmlns:p15="http://schemas.microsoft.com/office/powerpoint/2012/main">
+      <p15:sldGuideLst xmlns:p15="http://schemas.microsoft.com/office/powerpoint/2012/main" xmlns="">
         <p15:guide id="1" orient="horz" pos="1620">
           <p15:clr>
             <a:srgbClr val="A4A3A4"/>
@@ -148,7 +149,7 @@
       </p15:sldGuideLst>
     </p:ext>
     <p:ext uri="{2D200454-40CA-4A62-9FC3-DE9A4176ACB9}">
-      <p15:notesGuideLst xmlns:p15="http://schemas.microsoft.com/office/powerpoint/2012/main">
+      <p15:notesGuideLst xmlns:p15="http://schemas.microsoft.com/office/powerpoint/2012/main" xmlns="">
         <p15:guide id="1" orient="horz" pos="2880">
           <p15:clr>
             <a:srgbClr val="A4A3A4"/>
@@ -11654,6 +11655,13 @@
   <p:clrMapOvr>
     <a:masterClrMapping/>
   </p:clrMapOvr>
+  <p:timing>
+    <p:tnLst>
+      <p:par>
+        <p:cTn id="1" dur="indefinite" restart="never" nodeType="tmRoot"/>
+      </p:par>
+    </p:tnLst>
+  </p:timing>
 </p:sld>
 </file>
 
@@ -11750,6 +11758,13 @@
   <p:clrMapOvr>
     <a:masterClrMapping/>
   </p:clrMapOvr>
+  <p:timing>
+    <p:tnLst>
+      <p:par>
+        <p:cTn id="1" dur="indefinite" restart="never" nodeType="tmRoot"/>
+      </p:par>
+    </p:tnLst>
+  </p:timing>
 </p:sld>
 </file>
 
@@ -11935,6 +11950,13 @@
   <p:clrMapOvr>
     <a:masterClrMapping/>
   </p:clrMapOvr>
+  <p:timing>
+    <p:tnLst>
+      <p:par>
+        <p:cTn id="1" dur="indefinite" restart="never" nodeType="tmRoot"/>
+      </p:par>
+    </p:tnLst>
+  </p:timing>
 </p:sld>
 </file>
 
@@ -12141,6 +12163,13 @@
   <p:clrMapOvr>
     <a:masterClrMapping/>
   </p:clrMapOvr>
+  <p:timing>
+    <p:tnLst>
+      <p:par>
+        <p:cTn id="1" dur="indefinite" restart="never" nodeType="tmRoot"/>
+      </p:par>
+    </p:tnLst>
+  </p:timing>
 </p:sld>
 </file>
 
@@ -12177,7 +12206,7 @@
           <a:lstStyle/>
           <a:p>
             <a:r>
-              <a:rPr lang="en-GB" dirty="0" smtClean="0"/>
+              <a:rPr lang="en-US" dirty="0" smtClean="0"/>
               <a:t>CH4</a:t>
             </a:r>
             <a:endParaRPr lang="en-GB" dirty="0"/>
@@ -12186,26 +12215,51 @@
       </p:sp>
       <p:sp>
         <p:nvSpPr>
-          <p:cNvPr id="3" name="Content Placeholder 2"/>
+          <p:cNvPr id="4" name="Content Placeholder 3"/>
           <p:cNvSpPr>
             <a:spLocks noGrp="1"/>
           </p:cNvSpPr>
           <p:nvPr>
-            <p:ph idx="1"/>
-          </p:nvPr>
-        </p:nvSpPr>
-        <p:spPr/>
+            <p:ph sz="half" idx="2"/>
+          </p:nvPr>
+        </p:nvSpPr>
+        <p:spPr>
+          <a:xfrm>
+            <a:off x="3995936" y="1267199"/>
+            <a:ext cx="4055166" cy="3176759"/>
+          </a:xfrm>
+        </p:spPr>
         <p:txBody>
           <a:bodyPr/>
           <a:lstStyle/>
           <a:p>
-            <a:endParaRPr lang="en-GB" dirty="0" smtClean="0"/>
-          </a:p>
-        </p:txBody>
-      </p:sp>
-      <p:sp>
-        <p:nvSpPr>
-          <p:cNvPr id="5" name="灯片编号占位符 4"/>
+            <a:r>
+              <a:rPr lang="en-GB" sz="1050" dirty="0"/>
+              <a:t>T</a:t>
+            </a:r>
+            <a:r>
+              <a:rPr lang="en-GB" sz="1050" dirty="0" smtClean="0"/>
+              <a:t>he </a:t>
+            </a:r>
+            <a:r>
+              <a:rPr lang="en-GB" sz="1050" dirty="0"/>
+              <a:t>Grove - Gas Sensor(MQ2) module is useful for gas leakage detection (in home and industry). It is suitable for detecting H2, LPG, CH4, CO, Alcohol, Smoke or Propane. Due to its high sensitivity and fast response time, measurements can be taken as soon as possible. The sensitivity of the sensor can be adjusted by using the </a:t>
+            </a:r>
+            <a:r>
+              <a:rPr lang="en-GB" sz="1050" dirty="0" smtClean="0"/>
+              <a:t>potentiometer</a:t>
+            </a:r>
+            <a:r>
+              <a:rPr lang="en-US" altLang="zh-CN" sz="1050" dirty="0" smtClean="0"/>
+              <a:t>.</a:t>
+            </a:r>
+            <a:endParaRPr lang="en-GB" sz="1050" dirty="0"/>
+          </a:p>
+        </p:txBody>
+      </p:sp>
+      <p:sp>
+        <p:nvSpPr>
+          <p:cNvPr id="6" name="灯片编号占位符 5"/>
           <p:cNvSpPr>
             <a:spLocks noGrp="1"/>
           </p:cNvSpPr>
@@ -12227,16 +12281,131 @@
           </a:p>
         </p:txBody>
       </p:sp>
+      <p:pic>
+        <p:nvPicPr>
+          <p:cNvPr id="1026" name="Picture 2"/>
+          <p:cNvPicPr>
+            <a:picLocks noChangeAspect="1" noChangeArrowheads="1"/>
+          </p:cNvPicPr>
+          <p:nvPr/>
+        </p:nvPicPr>
+        <p:blipFill>
+          <a:blip r:embed="rId2">
+            <a:extLst>
+              <a:ext uri="{28A0092B-C50C-407E-A947-70E740481C1C}">
+                <a14:useLocalDpi xmlns:a14="http://schemas.microsoft.com/office/drawing/2010/main" val="0"/>
+              </a:ext>
+            </a:extLst>
+          </a:blip>
+          <a:srcRect/>
+          <a:stretch>
+            <a:fillRect/>
+          </a:stretch>
+        </p:blipFill>
+        <p:spPr bwMode="auto">
+          <a:xfrm>
+            <a:off x="107504" y="987574"/>
+            <a:ext cx="3295650" cy="2428875"/>
+          </a:xfrm>
+          <a:prstGeom prst="rect">
+            <a:avLst/>
+          </a:prstGeom>
+          <a:noFill/>
+          <a:ln>
+            <a:noFill/>
+          </a:ln>
+          <a:extLst>
+            <a:ext uri="{909E8E84-426E-40DD-AFC4-6F175D3DCCD1}">
+              <a14:hiddenFill xmlns:a14="http://schemas.microsoft.com/office/drawing/2010/main">
+                <a:solidFill>
+                  <a:schemeClr val="accent1"/>
+                </a:solidFill>
+              </a14:hiddenFill>
+            </a:ext>
+            <a:ext uri="{91240B29-F687-4F45-9708-019B960494DF}">
+              <a14:hiddenLine xmlns:a14="http://schemas.microsoft.com/office/drawing/2010/main" w="9525">
+                <a:solidFill>
+                  <a:schemeClr val="tx1"/>
+                </a:solidFill>
+                <a:miter lim="800000"/>
+                <a:headEnd/>
+                <a:tailEnd/>
+              </a14:hiddenLine>
+            </a:ext>
+          </a:extLst>
+        </p:spPr>
+      </p:pic>
+      <p:pic>
+        <p:nvPicPr>
+          <p:cNvPr id="1027" name="Picture 3"/>
+          <p:cNvPicPr>
+            <a:picLocks noChangeAspect="1" noChangeArrowheads="1"/>
+          </p:cNvPicPr>
+          <p:nvPr/>
+        </p:nvPicPr>
+        <p:blipFill>
+          <a:blip r:embed="rId3">
+            <a:extLst>
+              <a:ext uri="{28A0092B-C50C-407E-A947-70E740481C1C}">
+                <a14:useLocalDpi xmlns:a14="http://schemas.microsoft.com/office/drawing/2010/main" val="0"/>
+              </a:ext>
+            </a:extLst>
+          </a:blip>
+          <a:srcRect/>
+          <a:stretch>
+            <a:fillRect/>
+          </a:stretch>
+        </p:blipFill>
+        <p:spPr bwMode="auto">
+          <a:xfrm>
+            <a:off x="3621008" y="2502020"/>
+            <a:ext cx="4896544" cy="1504950"/>
+          </a:xfrm>
+          <a:prstGeom prst="rect">
+            <a:avLst/>
+          </a:prstGeom>
+          <a:noFill/>
+          <a:ln>
+            <a:noFill/>
+          </a:ln>
+          <a:extLst>
+            <a:ext uri="{909E8E84-426E-40DD-AFC4-6F175D3DCCD1}">
+              <a14:hiddenFill xmlns:a14="http://schemas.microsoft.com/office/drawing/2010/main">
+                <a:solidFill>
+                  <a:schemeClr val="accent1"/>
+                </a:solidFill>
+              </a14:hiddenFill>
+            </a:ext>
+            <a:ext uri="{91240B29-F687-4F45-9708-019B960494DF}">
+              <a14:hiddenLine xmlns:a14="http://schemas.microsoft.com/office/drawing/2010/main" w="9525">
+                <a:solidFill>
+                  <a:schemeClr val="tx1"/>
+                </a:solidFill>
+                <a:miter lim="800000"/>
+                <a:headEnd/>
+                <a:tailEnd/>
+              </a14:hiddenLine>
+            </a:ext>
+          </a:extLst>
+        </p:spPr>
+      </p:pic>
     </p:spTree>
     <p:extLst>
       <p:ext uri="{BB962C8B-B14F-4D97-AF65-F5344CB8AC3E}">
-        <p14:creationId xmlns:p14="http://schemas.microsoft.com/office/powerpoint/2010/main" val="1107435703"/>
+        <p14:creationId xmlns:p14="http://schemas.microsoft.com/office/powerpoint/2010/main" val="700919715"/>
       </p:ext>
     </p:extLst>
   </p:cSld>
   <p:clrMapOvr>
     <a:masterClrMapping/>
   </p:clrMapOvr>
+  <p:timing>
+    <p:tnLst>
+      <p:par>
+        <p:cTn id="1" dur="indefinite" restart="never" nodeType="tmRoot"/>
+      </p:par>
+    </p:tnLst>
+  </p:timing>
 </p:sld>
 </file>
 
@@ -12273,8 +12442,8 @@
           <a:lstStyle/>
           <a:p>
             <a:r>
-              <a:rPr lang="en-GB" dirty="0" smtClean="0"/>
-              <a:t>Air Quality</a:t>
+              <a:rPr lang="en-US" dirty="0" smtClean="0"/>
+              <a:t>Buzzer</a:t>
             </a:r>
             <a:endParaRPr lang="en-GB" dirty="0"/>
           </a:p>
@@ -12282,26 +12451,59 @@
       </p:sp>
       <p:sp>
         <p:nvSpPr>
-          <p:cNvPr id="3" name="Content Placeholder 2"/>
+          <p:cNvPr id="4" name="Content Placeholder 3"/>
           <p:cNvSpPr>
             <a:spLocks noGrp="1"/>
           </p:cNvSpPr>
           <p:nvPr>
-            <p:ph idx="1"/>
-          </p:nvPr>
-        </p:nvSpPr>
-        <p:spPr/>
+            <p:ph sz="half" idx="2"/>
+          </p:nvPr>
+        </p:nvSpPr>
+        <p:spPr>
+          <a:xfrm>
+            <a:off x="3995936" y="1267199"/>
+            <a:ext cx="4055166" cy="3176759"/>
+          </a:xfrm>
+        </p:spPr>
         <p:txBody>
           <a:bodyPr/>
           <a:lstStyle/>
           <a:p>
-            <a:endParaRPr lang="en-GB" dirty="0" smtClean="0"/>
-          </a:p>
-        </p:txBody>
-      </p:sp>
-      <p:sp>
-        <p:nvSpPr>
-          <p:cNvPr id="5" name="灯片编号占位符 4"/>
+            <a:r>
+              <a:rPr lang="en-GB" sz="1050" dirty="0"/>
+              <a:t>Buzzer, or </a:t>
+            </a:r>
+            <a:r>
+              <a:rPr lang="en-GB" sz="1050" dirty="0" err="1"/>
+              <a:t>Piezo</a:t>
+            </a:r>
+            <a:r>
+              <a:rPr lang="en-GB" sz="1050" dirty="0"/>
+              <a:t> speaker, is </a:t>
+            </a:r>
+            <a:r>
+              <a:rPr lang="en-GB" sz="1050" dirty="0" smtClean="0"/>
+              <a:t>being </a:t>
+            </a:r>
+            <a:r>
+              <a:rPr lang="en-GB" sz="1050" dirty="0"/>
+              <a:t>used as an alarm or </a:t>
+            </a:r>
+            <a:r>
+              <a:rPr lang="en-GB" sz="1050" dirty="0" smtClean="0"/>
+              <a:t>indicator</a:t>
+            </a:r>
+            <a:r>
+              <a:rPr lang="en-GB" sz="1050" dirty="0"/>
+              <a:t>.</a:t>
+            </a:r>
+            <a:endParaRPr lang="en-GB" sz="1050" dirty="0"/>
+          </a:p>
+        </p:txBody>
+      </p:sp>
+      <p:sp>
+        <p:nvSpPr>
+          <p:cNvPr id="6" name="灯片编号占位符 5"/>
           <p:cNvSpPr>
             <a:spLocks noGrp="1"/>
           </p:cNvSpPr>
@@ -12323,16 +12525,131 @@
           </a:p>
         </p:txBody>
       </p:sp>
+      <p:pic>
+        <p:nvPicPr>
+          <p:cNvPr id="2051" name="Picture 3"/>
+          <p:cNvPicPr>
+            <a:picLocks noChangeAspect="1" noChangeArrowheads="1"/>
+          </p:cNvPicPr>
+          <p:nvPr/>
+        </p:nvPicPr>
+        <p:blipFill>
+          <a:blip r:embed="rId2">
+            <a:extLst>
+              <a:ext uri="{28A0092B-C50C-407E-A947-70E740481C1C}">
+                <a14:useLocalDpi xmlns:a14="http://schemas.microsoft.com/office/drawing/2010/main" val="0"/>
+              </a:ext>
+            </a:extLst>
+          </a:blip>
+          <a:srcRect/>
+          <a:stretch>
+            <a:fillRect/>
+          </a:stretch>
+        </p:blipFill>
+        <p:spPr bwMode="auto">
+          <a:xfrm>
+            <a:off x="323528" y="1178045"/>
+            <a:ext cx="3124200" cy="2647950"/>
+          </a:xfrm>
+          <a:prstGeom prst="rect">
+            <a:avLst/>
+          </a:prstGeom>
+          <a:noFill/>
+          <a:ln>
+            <a:noFill/>
+          </a:ln>
+          <a:extLst>
+            <a:ext uri="{909E8E84-426E-40DD-AFC4-6F175D3DCCD1}">
+              <a14:hiddenFill xmlns:a14="http://schemas.microsoft.com/office/drawing/2010/main">
+                <a:solidFill>
+                  <a:schemeClr val="accent1"/>
+                </a:solidFill>
+              </a14:hiddenFill>
+            </a:ext>
+            <a:ext uri="{91240B29-F687-4F45-9708-019B960494DF}">
+              <a14:hiddenLine xmlns:a14="http://schemas.microsoft.com/office/drawing/2010/main" w="9525">
+                <a:solidFill>
+                  <a:schemeClr val="tx1"/>
+                </a:solidFill>
+                <a:miter lim="800000"/>
+                <a:headEnd/>
+                <a:tailEnd/>
+              </a14:hiddenLine>
+            </a:ext>
+          </a:extLst>
+        </p:spPr>
+      </p:pic>
+      <p:pic>
+        <p:nvPicPr>
+          <p:cNvPr id="2052" name="Picture 4"/>
+          <p:cNvPicPr>
+            <a:picLocks noChangeAspect="1" noChangeArrowheads="1"/>
+          </p:cNvPicPr>
+          <p:nvPr/>
+        </p:nvPicPr>
+        <p:blipFill>
+          <a:blip r:embed="rId3">
+            <a:extLst>
+              <a:ext uri="{28A0092B-C50C-407E-A947-70E740481C1C}">
+                <a14:useLocalDpi xmlns:a14="http://schemas.microsoft.com/office/drawing/2010/main" val="0"/>
+              </a:ext>
+            </a:extLst>
+          </a:blip>
+          <a:srcRect/>
+          <a:stretch>
+            <a:fillRect/>
+          </a:stretch>
+        </p:blipFill>
+        <p:spPr bwMode="auto">
+          <a:xfrm>
+            <a:off x="3779912" y="2283718"/>
+            <a:ext cx="5086672" cy="1133475"/>
+          </a:xfrm>
+          <a:prstGeom prst="rect">
+            <a:avLst/>
+          </a:prstGeom>
+          <a:noFill/>
+          <a:ln>
+            <a:noFill/>
+          </a:ln>
+          <a:extLst>
+            <a:ext uri="{909E8E84-426E-40DD-AFC4-6F175D3DCCD1}">
+              <a14:hiddenFill xmlns:a14="http://schemas.microsoft.com/office/drawing/2010/main">
+                <a:solidFill>
+                  <a:schemeClr val="accent1"/>
+                </a:solidFill>
+              </a14:hiddenFill>
+            </a:ext>
+            <a:ext uri="{91240B29-F687-4F45-9708-019B960494DF}">
+              <a14:hiddenLine xmlns:a14="http://schemas.microsoft.com/office/drawing/2010/main" w="9525">
+                <a:solidFill>
+                  <a:schemeClr val="tx1"/>
+                </a:solidFill>
+                <a:miter lim="800000"/>
+                <a:headEnd/>
+                <a:tailEnd/>
+              </a14:hiddenLine>
+            </a:ext>
+          </a:extLst>
+        </p:spPr>
+      </p:pic>
     </p:spTree>
     <p:extLst>
       <p:ext uri="{BB962C8B-B14F-4D97-AF65-F5344CB8AC3E}">
-        <p14:creationId xmlns:p14="http://schemas.microsoft.com/office/powerpoint/2010/main" val="1107435703"/>
+        <p14:creationId xmlns:p14="http://schemas.microsoft.com/office/powerpoint/2010/main" val="1247900463"/>
       </p:ext>
     </p:extLst>
   </p:cSld>
   <p:clrMapOvr>
     <a:masterClrMapping/>
   </p:clrMapOvr>
+  <p:timing>
+    <p:tnLst>
+      <p:par>
+        <p:cTn id="1" dur="indefinite" restart="never" nodeType="tmRoot"/>
+      </p:par>
+    </p:tnLst>
+  </p:timing>
 </p:sld>
 </file>
 
@@ -12370,6 +12687,109 @@
           <a:p>
             <a:r>
               <a:rPr lang="en-GB" dirty="0" smtClean="0"/>
+              <a:t>Air Quality</a:t>
+            </a:r>
+            <a:endParaRPr lang="en-GB" dirty="0"/>
+          </a:p>
+        </p:txBody>
+      </p:sp>
+      <p:sp>
+        <p:nvSpPr>
+          <p:cNvPr id="3" name="Content Placeholder 2"/>
+          <p:cNvSpPr>
+            <a:spLocks noGrp="1"/>
+          </p:cNvSpPr>
+          <p:nvPr>
+            <p:ph idx="1"/>
+          </p:nvPr>
+        </p:nvSpPr>
+        <p:spPr/>
+        <p:txBody>
+          <a:bodyPr/>
+          <a:lstStyle/>
+          <a:p>
+            <a:endParaRPr lang="en-GB" dirty="0" smtClean="0"/>
+          </a:p>
+        </p:txBody>
+      </p:sp>
+      <p:sp>
+        <p:nvSpPr>
+          <p:cNvPr id="5" name="灯片编号占位符 4"/>
+          <p:cNvSpPr>
+            <a:spLocks noGrp="1"/>
+          </p:cNvSpPr>
+          <p:nvPr>
+            <p:ph type="sldNum" sz="quarter" idx="10"/>
+          </p:nvPr>
+        </p:nvSpPr>
+        <p:spPr/>
+        <p:txBody>
+          <a:bodyPr/>
+          <a:lstStyle/>
+          <a:p>
+            <a:fld id="{F7E2903A-6526-4E0B-828D-C31687035264}" type="slidenum">
+              <a:rPr lang="en-GB" smtClean="0"/>
+              <a:pPr/>
+              <a:t>16</a:t>
+            </a:fld>
+            <a:endParaRPr lang="en-GB" dirty="0"/>
+          </a:p>
+        </p:txBody>
+      </p:sp>
+    </p:spTree>
+    <p:extLst>
+      <p:ext uri="{BB962C8B-B14F-4D97-AF65-F5344CB8AC3E}">
+        <p14:creationId xmlns:p14="http://schemas.microsoft.com/office/powerpoint/2010/main" val="1107435703"/>
+      </p:ext>
+    </p:extLst>
+  </p:cSld>
+  <p:clrMapOvr>
+    <a:masterClrMapping/>
+  </p:clrMapOvr>
+  <p:timing>
+    <p:tnLst>
+      <p:par>
+        <p:cTn id="1" dur="indefinite" restart="never" nodeType="tmRoot"/>
+      </p:par>
+    </p:tnLst>
+  </p:timing>
+</p:sld>
+</file>
+
+<file path=ppt/slides/slide17.xml><?xml version="1.0" encoding="utf-8"?>
+<p:sld xmlns:a="http://schemas.openxmlformats.org/drawingml/2006/main" xmlns:r="http://schemas.openxmlformats.org/officeDocument/2006/relationships" xmlns:p="http://schemas.openxmlformats.org/presentationml/2006/main">
+  <p:cSld>
+    <p:spTree>
+      <p:nvGrpSpPr>
+        <p:cNvPr id="1" name=""/>
+        <p:cNvGrpSpPr/>
+        <p:nvPr/>
+      </p:nvGrpSpPr>
+      <p:grpSpPr>
+        <a:xfrm>
+          <a:off x="0" y="0"/>
+          <a:ext cx="0" cy="0"/>
+          <a:chOff x="0" y="0"/>
+          <a:chExt cx="0" cy="0"/>
+        </a:xfrm>
+      </p:grpSpPr>
+      <p:sp>
+        <p:nvSpPr>
+          <p:cNvPr id="2" name="Title 1"/>
+          <p:cNvSpPr>
+            <a:spLocks noGrp="1"/>
+          </p:cNvSpPr>
+          <p:nvPr>
+            <p:ph type="title"/>
+          </p:nvPr>
+        </p:nvSpPr>
+        <p:spPr/>
+        <p:txBody>
+          <a:bodyPr/>
+          <a:lstStyle/>
+          <a:p>
+            <a:r>
+              <a:rPr lang="en-GB" dirty="0" smtClean="0"/>
               <a:t>Scenario</a:t>
             </a:r>
             <a:endParaRPr lang="en-GB" dirty="0"/>
@@ -12423,7 +12843,7 @@
             <a:fld id="{F7E2903A-6526-4E0B-828D-C31687035264}" type="slidenum">
               <a:rPr lang="en-GB" smtClean="0"/>
               <a:pPr/>
-              <a:t>16</a:t>
+              <a:t>17</a:t>
             </a:fld>
             <a:endParaRPr lang="en-GB" dirty="0"/>
           </a:p>
@@ -12629,82 +13049,13 @@
   <p:clrMapOvr>
     <a:masterClrMapping/>
   </p:clrMapOvr>
-</p:sld>
-</file>
-
-<file path=ppt/slides/slide17.xml><?xml version="1.0" encoding="utf-8"?>
-<p:sld xmlns:a="http://schemas.openxmlformats.org/drawingml/2006/main" xmlns:r="http://schemas.openxmlformats.org/officeDocument/2006/relationships" xmlns:p="http://schemas.openxmlformats.org/presentationml/2006/main">
-  <p:cSld>
-    <p:spTree>
-      <p:nvGrpSpPr>
-        <p:cNvPr id="1" name=""/>
-        <p:cNvGrpSpPr/>
-        <p:nvPr/>
-      </p:nvGrpSpPr>
-      <p:grpSpPr>
-        <a:xfrm>
-          <a:off x="0" y="0"/>
-          <a:ext cx="0" cy="0"/>
-          <a:chOff x="0" y="0"/>
-          <a:chExt cx="0" cy="0"/>
-        </a:xfrm>
-      </p:grpSpPr>
-      <p:sp>
-        <p:nvSpPr>
-          <p:cNvPr id="2" name="Title 1"/>
-          <p:cNvSpPr>
-            <a:spLocks noGrp="1"/>
-          </p:cNvSpPr>
-          <p:nvPr>
-            <p:ph type="ctrTitle"/>
-          </p:nvPr>
-        </p:nvSpPr>
-        <p:spPr/>
-        <p:txBody>
-          <a:bodyPr/>
-          <a:lstStyle/>
-          <a:p>
-            <a:r>
-              <a:rPr lang="en-GB" dirty="0" smtClean="0"/>
-              <a:t>Enhancement</a:t>
-            </a:r>
-            <a:endParaRPr lang="en-GB" dirty="0"/>
-          </a:p>
-        </p:txBody>
-      </p:sp>
-      <p:sp>
-        <p:nvSpPr>
-          <p:cNvPr id="3" name="Subtitle 2"/>
-          <p:cNvSpPr>
-            <a:spLocks noGrp="1"/>
-          </p:cNvSpPr>
-          <p:nvPr>
-            <p:ph type="subTitle" idx="1"/>
-          </p:nvPr>
-        </p:nvSpPr>
-        <p:spPr/>
-        <p:txBody>
-          <a:bodyPr/>
-          <a:lstStyle/>
-          <a:p>
-            <a:r>
-              <a:rPr lang="en-GB" dirty="0" smtClean="0"/>
-              <a:t>HHEM</a:t>
-            </a:r>
-            <a:endParaRPr lang="en-GB" dirty="0"/>
-          </a:p>
-        </p:txBody>
-      </p:sp>
-    </p:spTree>
-    <p:extLst>
-      <p:ext uri="{BB962C8B-B14F-4D97-AF65-F5344CB8AC3E}">
-        <p14:creationId xmlns:p14="http://schemas.microsoft.com/office/powerpoint/2010/main" val="643548604"/>
-      </p:ext>
-    </p:extLst>
-  </p:cSld>
-  <p:clrMapOvr>
-    <a:masterClrMapping/>
-  </p:clrMapOvr>
+  <p:timing>
+    <p:tnLst>
+      <p:par>
+        <p:cTn id="1" dur="indefinite" restart="never" nodeType="tmRoot"/>
+      </p:par>
+    </p:tnLst>
+  </p:timing>
 </p:sld>
 </file>
 
@@ -12732,7 +13083,7 @@
             <a:spLocks noGrp="1"/>
           </p:cNvSpPr>
           <p:nvPr>
-            <p:ph type="title"/>
+            <p:ph type="ctrTitle"/>
           </p:nvPr>
         </p:nvSpPr>
         <p:spPr/>
@@ -12742,7 +13093,7 @@
           <a:p>
             <a:r>
               <a:rPr lang="en-GB" dirty="0" smtClean="0"/>
-              <a:t>Proposal</a:t>
+              <a:t>Enhancement</a:t>
             </a:r>
             <a:endParaRPr lang="en-GB" dirty="0"/>
           </a:p>
@@ -12750,12 +13101,12 @@
       </p:sp>
       <p:sp>
         <p:nvSpPr>
-          <p:cNvPr id="3" name="Content Placeholder 2"/>
+          <p:cNvPr id="3" name="Subtitle 2"/>
           <p:cNvSpPr>
             <a:spLocks noGrp="1"/>
           </p:cNvSpPr>
           <p:nvPr>
-            <p:ph idx="1"/>
+            <p:ph type="subTitle" idx="1"/>
           </p:nvPr>
         </p:nvSpPr>
         <p:spPr/>
@@ -12765,34 +13116,8 @@
           <a:p>
             <a:r>
               <a:rPr lang="en-GB" dirty="0" smtClean="0"/>
-              <a:t>Human Detecting</a:t>
-            </a:r>
-          </a:p>
-          <a:p>
-            <a:endParaRPr lang="en-GB" dirty="0" smtClean="0"/>
-          </a:p>
-        </p:txBody>
-      </p:sp>
-      <p:sp>
-        <p:nvSpPr>
-          <p:cNvPr id="5" name="灯片编号占位符 4"/>
-          <p:cNvSpPr>
-            <a:spLocks noGrp="1"/>
-          </p:cNvSpPr>
-          <p:nvPr>
-            <p:ph type="sldNum" sz="quarter" idx="10"/>
-          </p:nvPr>
-        </p:nvSpPr>
-        <p:spPr/>
-        <p:txBody>
-          <a:bodyPr/>
-          <a:lstStyle/>
-          <a:p>
-            <a:fld id="{F7E2903A-6526-4E0B-828D-C31687035264}" type="slidenum">
-              <a:rPr lang="en-GB" smtClean="0"/>
-              <a:pPr/>
-              <a:t>18</a:t>
-            </a:fld>
+              <a:t>HHEM</a:t>
+            </a:r>
             <a:endParaRPr lang="en-GB" dirty="0"/>
           </a:p>
         </p:txBody>
@@ -12800,13 +13125,20 @@
     </p:spTree>
     <p:extLst>
       <p:ext uri="{BB962C8B-B14F-4D97-AF65-F5344CB8AC3E}">
-        <p14:creationId xmlns:p14="http://schemas.microsoft.com/office/powerpoint/2010/main" val="3732645470"/>
+        <p14:creationId xmlns:p14="http://schemas.microsoft.com/office/powerpoint/2010/main" val="643548604"/>
       </p:ext>
     </p:extLst>
   </p:cSld>
   <p:clrMapOvr>
     <a:masterClrMapping/>
   </p:clrMapOvr>
+  <p:timing>
+    <p:tnLst>
+      <p:par>
+        <p:cTn id="1" dur="indefinite" restart="never" nodeType="tmRoot"/>
+      </p:par>
+    </p:tnLst>
+  </p:timing>
 </p:sld>
 </file>
 
@@ -12842,7 +13174,11 @@
           <a:bodyPr/>
           <a:lstStyle/>
           <a:p>
-            <a:endParaRPr lang="en-GB"/>
+            <a:r>
+              <a:rPr lang="en-GB" dirty="0" smtClean="0"/>
+              <a:t>Proposal</a:t>
+            </a:r>
+            <a:endParaRPr lang="en-GB" dirty="0"/>
           </a:p>
         </p:txBody>
       </p:sp>
@@ -12853,7 +13189,7 @@
             <a:spLocks noGrp="1"/>
           </p:cNvSpPr>
           <p:nvPr>
-            <p:ph sz="half" idx="1"/>
+            <p:ph idx="1"/>
           </p:nvPr>
         </p:nvSpPr>
         <p:spPr/>
@@ -12861,32 +13197,19 @@
           <a:bodyPr/>
           <a:lstStyle/>
           <a:p>
-            <a:endParaRPr lang="en-GB" dirty="0"/>
-          </a:p>
-        </p:txBody>
-      </p:sp>
-      <p:sp>
-        <p:nvSpPr>
-          <p:cNvPr id="4" name="Content Placeholder 3"/>
-          <p:cNvSpPr>
-            <a:spLocks noGrp="1"/>
-          </p:cNvSpPr>
-          <p:nvPr>
-            <p:ph sz="half" idx="2"/>
-          </p:nvPr>
-        </p:nvSpPr>
-        <p:spPr/>
-        <p:txBody>
-          <a:bodyPr/>
-          <a:lstStyle/>
-          <a:p>
-            <a:endParaRPr lang="en-GB" dirty="0"/>
-          </a:p>
-        </p:txBody>
-      </p:sp>
-      <p:sp>
-        <p:nvSpPr>
-          <p:cNvPr id="6" name="灯片编号占位符 5"/>
+            <a:r>
+              <a:rPr lang="en-GB" dirty="0" smtClean="0"/>
+              <a:t>Human Detecting</a:t>
+            </a:r>
+          </a:p>
+          <a:p>
+            <a:endParaRPr lang="en-GB" dirty="0" smtClean="0"/>
+          </a:p>
+        </p:txBody>
+      </p:sp>
+      <p:sp>
+        <p:nvSpPr>
+          <p:cNvPr id="5" name="灯片编号占位符 4"/>
           <p:cNvSpPr>
             <a:spLocks noGrp="1"/>
           </p:cNvSpPr>
@@ -12911,13 +13234,20 @@
     </p:spTree>
     <p:extLst>
       <p:ext uri="{BB962C8B-B14F-4D97-AF65-F5344CB8AC3E}">
-        <p14:creationId xmlns:p14="http://schemas.microsoft.com/office/powerpoint/2010/main" val="2471984264"/>
+        <p14:creationId xmlns:p14="http://schemas.microsoft.com/office/powerpoint/2010/main" val="3732645470"/>
       </p:ext>
     </p:extLst>
   </p:cSld>
   <p:clrMapOvr>
     <a:masterClrMapping/>
   </p:clrMapOvr>
+  <p:timing>
+    <p:tnLst>
+      <p:par>
+        <p:cTn id="1" dur="indefinite" restart="never" nodeType="tmRoot"/>
+      </p:par>
+    </p:tnLst>
+  </p:timing>
 </p:sld>
 </file>
 
@@ -13040,6 +13370,13 @@
   <p:clrMapOvr>
     <a:masterClrMapping/>
   </p:clrMapOvr>
+  <p:timing>
+    <p:tnLst>
+      <p:par>
+        <p:cTn id="1" dur="indefinite" restart="never" nodeType="tmRoot"/>
+      </p:par>
+    </p:tnLst>
+  </p:timing>
 </p:sld>
 </file>
 
@@ -13062,6 +13399,124 @@
       </p:grpSpPr>
       <p:sp>
         <p:nvSpPr>
+          <p:cNvPr id="2" name="Title 1"/>
+          <p:cNvSpPr>
+            <a:spLocks noGrp="1"/>
+          </p:cNvSpPr>
+          <p:nvPr>
+            <p:ph type="title"/>
+          </p:nvPr>
+        </p:nvSpPr>
+        <p:spPr/>
+        <p:txBody>
+          <a:bodyPr/>
+          <a:lstStyle/>
+          <a:p>
+            <a:endParaRPr lang="en-GB"/>
+          </a:p>
+        </p:txBody>
+      </p:sp>
+      <p:sp>
+        <p:nvSpPr>
+          <p:cNvPr id="3" name="Content Placeholder 2"/>
+          <p:cNvSpPr>
+            <a:spLocks noGrp="1"/>
+          </p:cNvSpPr>
+          <p:nvPr>
+            <p:ph sz="half" idx="1"/>
+          </p:nvPr>
+        </p:nvSpPr>
+        <p:spPr/>
+        <p:txBody>
+          <a:bodyPr/>
+          <a:lstStyle/>
+          <a:p>
+            <a:endParaRPr lang="en-GB" dirty="0"/>
+          </a:p>
+        </p:txBody>
+      </p:sp>
+      <p:sp>
+        <p:nvSpPr>
+          <p:cNvPr id="4" name="Content Placeholder 3"/>
+          <p:cNvSpPr>
+            <a:spLocks noGrp="1"/>
+          </p:cNvSpPr>
+          <p:nvPr>
+            <p:ph sz="half" idx="2"/>
+          </p:nvPr>
+        </p:nvSpPr>
+        <p:spPr/>
+        <p:txBody>
+          <a:bodyPr/>
+          <a:lstStyle/>
+          <a:p>
+            <a:endParaRPr lang="en-GB" dirty="0"/>
+          </a:p>
+        </p:txBody>
+      </p:sp>
+      <p:sp>
+        <p:nvSpPr>
+          <p:cNvPr id="6" name="灯片编号占位符 5"/>
+          <p:cNvSpPr>
+            <a:spLocks noGrp="1"/>
+          </p:cNvSpPr>
+          <p:nvPr>
+            <p:ph type="sldNum" sz="quarter" idx="10"/>
+          </p:nvPr>
+        </p:nvSpPr>
+        <p:spPr/>
+        <p:txBody>
+          <a:bodyPr/>
+          <a:lstStyle/>
+          <a:p>
+            <a:fld id="{F7E2903A-6526-4E0B-828D-C31687035264}" type="slidenum">
+              <a:rPr lang="en-GB" smtClean="0"/>
+              <a:pPr/>
+              <a:t>20</a:t>
+            </a:fld>
+            <a:endParaRPr lang="en-GB" dirty="0"/>
+          </a:p>
+        </p:txBody>
+      </p:sp>
+    </p:spTree>
+    <p:extLst>
+      <p:ext uri="{BB962C8B-B14F-4D97-AF65-F5344CB8AC3E}">
+        <p14:creationId xmlns:p14="http://schemas.microsoft.com/office/powerpoint/2010/main" val="2471984264"/>
+      </p:ext>
+    </p:extLst>
+  </p:cSld>
+  <p:clrMapOvr>
+    <a:masterClrMapping/>
+  </p:clrMapOvr>
+  <p:timing>
+    <p:tnLst>
+      <p:par>
+        <p:cTn id="1" dur="indefinite" restart="never" nodeType="tmRoot"/>
+      </p:par>
+    </p:tnLst>
+  </p:timing>
+</p:sld>
+</file>
+
+<file path=ppt/slides/slide21.xml><?xml version="1.0" encoding="utf-8"?>
+<p:sld xmlns:a="http://schemas.openxmlformats.org/drawingml/2006/main" xmlns:r="http://schemas.openxmlformats.org/officeDocument/2006/relationships" xmlns:p="http://schemas.openxmlformats.org/presentationml/2006/main">
+  <p:cSld>
+    <p:spTree>
+      <p:nvGrpSpPr>
+        <p:cNvPr id="1" name=""/>
+        <p:cNvGrpSpPr/>
+        <p:nvPr/>
+      </p:nvGrpSpPr>
+      <p:grpSpPr>
+        <a:xfrm>
+          <a:off x="0" y="0"/>
+          <a:ext cx="0" cy="0"/>
+          <a:chOff x="0" y="0"/>
+          <a:chExt cx="0" cy="0"/>
+        </a:xfrm>
+      </p:grpSpPr>
+      <p:sp>
+        <p:nvSpPr>
           <p:cNvPr id="2" name="CONTACTINFO"/>
           <p:cNvSpPr txBox="1"/>
           <p:nvPr/>
@@ -13157,6 +13612,13 @@
   <p:clrMapOvr>
     <a:masterClrMapping/>
   </p:clrMapOvr>
+  <p:timing>
+    <p:tnLst>
+      <p:par>
+        <p:cTn id="1" dur="indefinite" restart="never" nodeType="tmRoot"/>
+      </p:par>
+    </p:tnLst>
+  </p:timing>
 </p:sld>
 </file>
 
@@ -13318,6 +13780,13 @@
   <p:clrMapOvr>
     <a:masterClrMapping/>
   </p:clrMapOvr>
+  <p:timing>
+    <p:tnLst>
+      <p:par>
+        <p:cTn id="1" dur="indefinite" restart="never" nodeType="tmRoot"/>
+      </p:par>
+    </p:tnLst>
+  </p:timing>
 </p:sld>
 </file>
 
@@ -13394,6 +13863,13 @@
   <p:clrMapOvr>
     <a:masterClrMapping/>
   </p:clrMapOvr>
+  <p:timing>
+    <p:tnLst>
+      <p:par>
+        <p:cTn id="1" dur="indefinite" restart="never" nodeType="tmRoot"/>
+      </p:par>
+    </p:tnLst>
+  </p:timing>
 </p:sld>
 </file>
 
@@ -13522,6 +13998,13 @@
   <p:clrMapOvr>
     <a:masterClrMapping/>
   </p:clrMapOvr>
+  <p:timing>
+    <p:tnLst>
+      <p:par>
+        <p:cTn id="1" dur="indefinite" restart="never" nodeType="tmRoot"/>
+      </p:par>
+    </p:tnLst>
+  </p:timing>
 </p:sld>
 </file>
 
@@ -13598,6 +14081,13 @@
   <p:clrMapOvr>
     <a:masterClrMapping/>
   </p:clrMapOvr>
+  <p:timing>
+    <p:tnLst>
+      <p:par>
+        <p:cTn id="1" dur="indefinite" restart="never" nodeType="tmRoot"/>
+      </p:par>
+    </p:tnLst>
+  </p:timing>
 </p:sld>
 </file>
 
@@ -13733,6 +14223,13 @@
   <p:clrMapOvr>
     <a:masterClrMapping/>
   </p:clrMapOvr>
+  <p:timing>
+    <p:tnLst>
+      <p:par>
+        <p:cTn id="1" dur="indefinite" restart="never" nodeType="tmRoot"/>
+      </p:par>
+    </p:tnLst>
+  </p:timing>
 </p:sld>
 </file>
 
@@ -13809,6 +14306,13 @@
   <p:clrMapOvr>
     <a:masterClrMapping/>
   </p:clrMapOvr>
+  <p:timing>
+    <p:tnLst>
+      <p:par>
+        <p:cTn id="1" dur="indefinite" restart="never" nodeType="tmRoot"/>
+      </p:par>
+    </p:tnLst>
+  </p:timing>
 </p:sld>
 </file>
 
@@ -13914,6 +14418,13 @@
   <p:clrMapOvr>
     <a:masterClrMapping/>
   </p:clrMapOvr>
+  <p:timing>
+    <p:tnLst>
+      <p:par>
+        <p:cTn id="1" dur="indefinite" restart="never" nodeType="tmRoot"/>
+      </p:par>
+    </p:tnLst>
+  </p:timing>
 </p:sld>
 </file>
 
@@ -14296,7 +14807,7 @@
   </a:extraClrSchemeLst>
   <a:extLst>
     <a:ext uri="{05A4C25C-085E-4340-85A3-A5531E510DB2}">
-      <thm15:themeFamily xmlns:thm15="http://schemas.microsoft.com/office/thememl/2012/main" name="TietoWide.potx" id="{407FC52C-B31F-416B-B0DF-E64EDCAD1AAD}" vid="{D1606DFC-6FAD-4E06-AAC4-8659CF7D3AA4}"/>
+      <thm15:themeFamily xmlns:thm15="http://schemas.microsoft.com/office/thememl/2012/main" xmlns="" name="TietoWide.potx" id="{407FC52C-B31F-416B-B0DF-E64EDCAD1AAD}" vid="{D1606DFC-6FAD-4E06-AAC4-8659CF7D3AA4}"/>
     </a:ext>
   </a:extLst>
 </a:theme>
@@ -14693,7 +15204,7 @@
   </a:extraClrSchemeLst>
   <a:extLst>
     <a:ext uri="{05A4C25C-085E-4340-85A3-A5531E510DB2}">
-      <thm15:themeFamily xmlns:thm15="http://schemas.microsoft.com/office/thememl/2012/main" name="TietoWide.potx" id="{407FC52C-B31F-416B-B0DF-E64EDCAD1AAD}" vid="{28909277-7591-4C81-9516-753778D0A93A}"/>
+      <thm15:themeFamily xmlns:thm15="http://schemas.microsoft.com/office/thememl/2012/main" xmlns="" name="TietoWide.potx" id="{407FC52C-B31F-416B-B0DF-E64EDCAD1AAD}" vid="{28909277-7591-4C81-9516-753778D0A93A}"/>
     </a:ext>
   </a:extLst>
 </a:theme>
@@ -15090,7 +15601,7 @@
   </a:extraClrSchemeLst>
   <a:extLst>
     <a:ext uri="{05A4C25C-085E-4340-85A3-A5531E510DB2}">
-      <thm15:themeFamily xmlns:thm15="http://schemas.microsoft.com/office/thememl/2012/main" name="TietoWide.potx" id="{407FC52C-B31F-416B-B0DF-E64EDCAD1AAD}" vid="{21F28A9E-4B05-468D-95BF-99C04B67B517}"/>
+      <thm15:themeFamily xmlns:thm15="http://schemas.microsoft.com/office/thememl/2012/main" xmlns="" name="TietoWide.potx" id="{407FC52C-B31F-416B-B0DF-E64EDCAD1AAD}" vid="{21F28A9E-4B05-468D-95BF-99C04B67B517}"/>
     </a:ext>
   </a:extLst>
 </a:theme>
@@ -15487,7 +15998,7 @@
   </a:extraClrSchemeLst>
   <a:extLst>
     <a:ext uri="{05A4C25C-085E-4340-85A3-A5531E510DB2}">
-      <thm15:themeFamily xmlns:thm15="http://schemas.microsoft.com/office/thememl/2012/main" name="TietoWide.potx" id="{407FC52C-B31F-416B-B0DF-E64EDCAD1AAD}" vid="{F89F9D2D-6F40-4A37-93D4-5871285F8B21}"/>
+      <thm15:themeFamily xmlns:thm15="http://schemas.microsoft.com/office/thememl/2012/main" xmlns="" name="TietoWide.potx" id="{407FC52C-B31F-416B-B0DF-E64EDCAD1AAD}" vid="{F89F9D2D-6F40-4A37-93D4-5871285F8B21}"/>
     </a:ext>
   </a:extLst>
 </a:theme>

</xml_diff>

<commit_message>
remove scenario ppt add enhancement ppt
</commit_message>
<xml_diff>
--- a/hand-held_environment_monitor_Template.pptx
+++ b/hand-held_environment_monitor_Template.pptx
@@ -8,10 +8,10 @@
     <p:sldMasterId id="2147483699" r:id="rId4"/>
   </p:sldMasterIdLst>
   <p:notesMasterIdLst>
-    <p:notesMasterId r:id="rId29"/>
+    <p:notesMasterId r:id="rId26"/>
   </p:notesMasterIdLst>
   <p:handoutMasterIdLst>
-    <p:handoutMasterId r:id="rId30"/>
+    <p:handoutMasterId r:id="rId27"/>
   </p:handoutMasterIdLst>
   <p:sldIdLst>
     <p:sldId id="256" r:id="rId5"/>
@@ -32,12 +32,9 @@
     <p:sldId id="280" r:id="rId20"/>
     <p:sldId id="281" r:id="rId21"/>
     <p:sldId id="282" r:id="rId22"/>
-    <p:sldId id="274" r:id="rId23"/>
-    <p:sldId id="279" r:id="rId24"/>
-    <p:sldId id="276" r:id="rId25"/>
-    <p:sldId id="277" r:id="rId26"/>
-    <p:sldId id="265" r:id="rId27"/>
-    <p:sldId id="261" r:id="rId28"/>
+    <p:sldId id="276" r:id="rId23"/>
+    <p:sldId id="277" r:id="rId24"/>
+    <p:sldId id="261" r:id="rId25"/>
   </p:sldIdLst>
   <p:sldSz cx="9144000" cy="5143500" type="screen16x9"/>
   <p:notesSz cx="6858000" cy="9144000"/>
@@ -1328,8 +1325,8 @@
     <dgm:cxn modelId="{714A23FF-BA44-4EB8-B483-3D5DF528D5CC}" type="presOf" srcId="{6C1B94BE-6852-4EBF-81F5-B7394C883F29}" destId="{9CADC56C-2549-413C-A4B3-D0E8F7085CB4}" srcOrd="0" destOrd="0" presId="urn:microsoft.com/office/officeart/2005/8/layout/radial4"/>
     <dgm:cxn modelId="{73B189AC-C3C8-4555-B470-FE3EC73F6234}" type="presOf" srcId="{B51F6A52-2D75-4129-8C99-32EBEE9D862F}" destId="{F7C0FD41-478A-46A3-B2D4-0C9B59CC473A}" srcOrd="0" destOrd="0" presId="urn:microsoft.com/office/officeart/2005/8/layout/radial4"/>
     <dgm:cxn modelId="{45957881-71CE-447A-9B20-DCE3D255123D}" srcId="{F367BEBF-D9F1-4A32-9C07-AEB36DA575D5}" destId="{2C5A8E47-5FB9-453D-B2AA-3AFEF77087B7}" srcOrd="1" destOrd="0" parTransId="{6C1B94BE-6852-4EBF-81F5-B7394C883F29}" sibTransId="{4BBDF689-549C-40D0-AD16-3103BA374954}"/>
+    <dgm:cxn modelId="{81D6FC2B-B93A-45D1-B1E1-C5FB6BAF8CEB}" type="presOf" srcId="{2C5A8E47-5FB9-453D-B2AA-3AFEF77087B7}" destId="{59491F13-2308-41AE-90B9-8F6BADDEDFF4}" srcOrd="0" destOrd="0" presId="urn:microsoft.com/office/officeart/2005/8/layout/radial4"/>
     <dgm:cxn modelId="{E1D28859-7496-4B7C-B9C5-A111C5D06488}" type="presOf" srcId="{754C3326-FC53-4CC7-B281-CC03656AEDA6}" destId="{B5DDEEE0-788D-4A47-8981-9A3D05B4237C}" srcOrd="0" destOrd="0" presId="urn:microsoft.com/office/officeart/2005/8/layout/radial4"/>
-    <dgm:cxn modelId="{81D6FC2B-B93A-45D1-B1E1-C5FB6BAF8CEB}" type="presOf" srcId="{2C5A8E47-5FB9-453D-B2AA-3AFEF77087B7}" destId="{59491F13-2308-41AE-90B9-8F6BADDEDFF4}" srcOrd="0" destOrd="0" presId="urn:microsoft.com/office/officeart/2005/8/layout/radial4"/>
     <dgm:cxn modelId="{AD678C62-21F8-4C32-B2EC-C81749827E50}" srcId="{F367BEBF-D9F1-4A32-9C07-AEB36DA575D5}" destId="{98BBC121-5C91-4DC9-B19B-3144686B63E6}" srcOrd="0" destOrd="0" parTransId="{754C3326-FC53-4CC7-B281-CC03656AEDA6}" sibTransId="{A0FEE6C0-3DC3-4F2F-A775-1E9E67EB8420}"/>
     <dgm:cxn modelId="{52713573-B336-44B8-9DE2-CAA95CE7CA39}" srcId="{F367BEBF-D9F1-4A32-9C07-AEB36DA575D5}" destId="{04FADAF6-9C01-4EB0-A40B-FDC49A2FEB2D}" srcOrd="3" destOrd="0" parTransId="{7F064D22-915C-4E96-A693-282E3C9907E4}" sibTransId="{E706EA7B-0C28-460D-8DFA-8FD6741B10EF}"/>
     <dgm:cxn modelId="{EFD6AB27-83C2-430E-B837-B60711DC63D7}" type="presParOf" srcId="{C4D07FF7-8274-4816-A43F-F734A84E6C11}" destId="{BA7B139A-1A2F-497B-9463-05040C97EBF7}" srcOrd="0" destOrd="0" presId="urn:microsoft.com/office/officeart/2005/8/layout/radial4"/>
@@ -1360,554 +1357,6 @@
       <dsp:cNvGrpSpPr/>
     </dsp:nvGrpSpPr>
     <dsp:grpSpPr/>
-    <dsp:sp modelId="{BA7B139A-1A2F-497B-9463-05040C97EBF7}">
-      <dsp:nvSpPr>
-        <dsp:cNvPr id="0" name=""/>
-        <dsp:cNvSpPr/>
-      </dsp:nvSpPr>
-      <dsp:spPr>
-        <a:xfrm>
-          <a:off x="5563941" y="2526744"/>
-          <a:ext cx="1873286" cy="364661"/>
-        </a:xfrm>
-        <a:prstGeom prst="ellipse">
-          <a:avLst/>
-        </a:prstGeom>
-        <a:solidFill>
-          <a:schemeClr val="bg1"/>
-        </a:solidFill>
-        <a:ln w="25400" cap="flat" cmpd="sng" algn="ctr">
-          <a:solidFill>
-            <a:schemeClr val="lt1">
-              <a:hueOff val="0"/>
-              <a:satOff val="0"/>
-              <a:lumOff val="0"/>
-              <a:alphaOff val="0"/>
-            </a:schemeClr>
-          </a:solidFill>
-          <a:prstDash val="solid"/>
-        </a:ln>
-        <a:effectLst/>
-      </dsp:spPr>
-      <dsp:style>
-        <a:lnRef idx="2">
-          <a:scrgbClr r="0" g="0" b="0"/>
-        </a:lnRef>
-        <a:fillRef idx="1">
-          <a:scrgbClr r="0" g="0" b="0"/>
-        </a:fillRef>
-        <a:effectRef idx="0">
-          <a:scrgbClr r="0" g="0" b="0"/>
-        </a:effectRef>
-        <a:fontRef idx="minor">
-          <a:schemeClr val="lt1"/>
-        </a:fontRef>
-      </dsp:style>
-      <dsp:txBody>
-        <a:bodyPr spcFirstLastPara="0" vert="horz" wrap="square" lIns="10160" tIns="10160" rIns="10160" bIns="10160" numCol="1" spcCol="1270" anchor="ctr" anchorCtr="0">
-          <a:noAutofit/>
-        </a:bodyPr>
-        <a:lstStyle/>
-        <a:p>
-          <a:pPr lvl="0" algn="ctr" defTabSz="711200">
-            <a:lnSpc>
-              <a:spcPct val="90000"/>
-            </a:lnSpc>
-            <a:spcBef>
-              <a:spcPct val="0"/>
-            </a:spcBef>
-            <a:spcAft>
-              <a:spcPct val="35000"/>
-            </a:spcAft>
-          </a:pPr>
-          <a:r>
-            <a:rPr lang="en-US" altLang="zh-CN" sz="1600" kern="1200" dirty="0" smtClean="0">
-              <a:solidFill>
-                <a:schemeClr val="tx2"/>
-              </a:solidFill>
-            </a:rPr>
-            <a:t>Cloud Server</a:t>
-          </a:r>
-        </a:p>
-      </dsp:txBody>
-      <dsp:txXfrm>
-        <a:off x="5838277" y="2580147"/>
-        <a:ext cx="1324614" cy="257855"/>
-      </dsp:txXfrm>
-    </dsp:sp>
-    <dsp:sp modelId="{B5DDEEE0-788D-4A47-8981-9A3D05B4237C}">
-      <dsp:nvSpPr>
-        <dsp:cNvPr id="0" name=""/>
-        <dsp:cNvSpPr/>
-      </dsp:nvSpPr>
-      <dsp:spPr>
-        <a:xfrm rot="10800000">
-          <a:off x="5002930" y="2403048"/>
-          <a:ext cx="714507" cy="432279"/>
-        </a:xfrm>
-        <a:prstGeom prst="leftArrow">
-          <a:avLst>
-            <a:gd name="adj1" fmla="val 60000"/>
-            <a:gd name="adj2" fmla="val 50000"/>
-          </a:avLst>
-        </a:prstGeom>
-        <a:solidFill>
-          <a:schemeClr val="accent1">
-            <a:lumMod val="60000"/>
-            <a:lumOff val="40000"/>
-          </a:schemeClr>
-        </a:solidFill>
-        <a:ln>
-          <a:noFill/>
-        </a:ln>
-        <a:effectLst/>
-      </dsp:spPr>
-      <dsp:style>
-        <a:lnRef idx="0">
-          <a:scrgbClr r="0" g="0" b="0"/>
-        </a:lnRef>
-        <a:fillRef idx="1">
-          <a:scrgbClr r="0" g="0" b="0"/>
-        </a:fillRef>
-        <a:effectRef idx="0">
-          <a:scrgbClr r="0" g="0" b="0"/>
-        </a:effectRef>
-        <a:fontRef idx="minor">
-          <a:schemeClr val="lt1"/>
-        </a:fontRef>
-      </dsp:style>
-    </dsp:sp>
-    <dsp:sp modelId="{084A16DB-BBA9-446B-9E05-BA04740747E0}">
-      <dsp:nvSpPr>
-        <dsp:cNvPr id="0" name=""/>
-        <dsp:cNvSpPr/>
-      </dsp:nvSpPr>
-      <dsp:spPr>
-        <a:xfrm>
-          <a:off x="3456631" y="2440134"/>
-          <a:ext cx="1440931" cy="396682"/>
-        </a:xfrm>
-        <a:prstGeom prst="roundRect">
-          <a:avLst>
-            <a:gd name="adj" fmla="val 10000"/>
-          </a:avLst>
-        </a:prstGeom>
-        <a:solidFill>
-          <a:schemeClr val="bg1"/>
-        </a:solidFill>
-        <a:ln w="25400" cap="flat" cmpd="sng" algn="ctr">
-          <a:solidFill>
-            <a:schemeClr val="lt1">
-              <a:hueOff val="0"/>
-              <a:satOff val="0"/>
-              <a:lumOff val="0"/>
-              <a:alphaOff val="0"/>
-            </a:schemeClr>
-          </a:solidFill>
-          <a:prstDash val="solid"/>
-        </a:ln>
-        <a:effectLst/>
-      </dsp:spPr>
-      <dsp:style>
-        <a:lnRef idx="2">
-          <a:scrgbClr r="0" g="0" b="0"/>
-        </a:lnRef>
-        <a:fillRef idx="1">
-          <a:scrgbClr r="0" g="0" b="0"/>
-        </a:fillRef>
-        <a:effectRef idx="0">
-          <a:scrgbClr r="0" g="0" b="0"/>
-        </a:effectRef>
-        <a:fontRef idx="minor">
-          <a:schemeClr val="lt1"/>
-        </a:fontRef>
-      </dsp:style>
-      <dsp:txBody>
-        <a:bodyPr spcFirstLastPara="0" vert="horz" wrap="square" lIns="30480" tIns="30480" rIns="30480" bIns="30480" numCol="1" spcCol="1270" anchor="ctr" anchorCtr="0">
-          <a:noAutofit/>
-        </a:bodyPr>
-        <a:lstStyle/>
-        <a:p>
-          <a:pPr lvl="0" algn="ctr" defTabSz="711200">
-            <a:lnSpc>
-              <a:spcPct val="90000"/>
-            </a:lnSpc>
-            <a:spcBef>
-              <a:spcPct val="0"/>
-            </a:spcBef>
-            <a:spcAft>
-              <a:spcPct val="35000"/>
-            </a:spcAft>
-          </a:pPr>
-          <a:r>
-            <a:rPr lang="en-US" altLang="zh-CN" sz="1600" kern="1200" dirty="0" smtClean="0">
-              <a:solidFill>
-                <a:schemeClr val="tx2"/>
-              </a:solidFill>
-            </a:rPr>
-            <a:t>Yun Shield</a:t>
-          </a:r>
-        </a:p>
-      </dsp:txBody>
-      <dsp:txXfrm>
-        <a:off x="3468249" y="2451752"/>
-        <a:ext cx="1417695" cy="373446"/>
-      </dsp:txXfrm>
-    </dsp:sp>
-    <dsp:sp modelId="{9CADC56C-2549-413C-A4B3-D0E8F7085CB4}">
-      <dsp:nvSpPr>
-        <dsp:cNvPr id="0" name=""/>
-        <dsp:cNvSpPr/>
-      </dsp:nvSpPr>
-      <dsp:spPr>
-        <a:xfrm rot="10855017">
-          <a:off x="2551518" y="2370748"/>
-          <a:ext cx="745935" cy="432279"/>
-        </a:xfrm>
-        <a:prstGeom prst="leftArrow">
-          <a:avLst>
-            <a:gd name="adj1" fmla="val 60000"/>
-            <a:gd name="adj2" fmla="val 50000"/>
-          </a:avLst>
-        </a:prstGeom>
-        <a:solidFill>
-          <a:schemeClr val="accent1">
-            <a:lumMod val="60000"/>
-            <a:lumOff val="40000"/>
-          </a:schemeClr>
-        </a:solidFill>
-        <a:ln>
-          <a:noFill/>
-        </a:ln>
-        <a:effectLst/>
-      </dsp:spPr>
-      <dsp:style>
-        <a:lnRef idx="0">
-          <a:scrgbClr r="0" g="0" b="0"/>
-        </a:lnRef>
-        <a:fillRef idx="1">
-          <a:scrgbClr r="0" g="0" b="0"/>
-        </a:fillRef>
-        <a:effectRef idx="0">
-          <a:scrgbClr r="0" g="0" b="0"/>
-        </a:effectRef>
-        <a:fontRef idx="minor">
-          <a:schemeClr val="lt1"/>
-        </a:fontRef>
-      </dsp:style>
-    </dsp:sp>
-    <dsp:sp modelId="{59491F13-2308-41AE-90B9-8F6BADDEDFF4}">
-      <dsp:nvSpPr>
-        <dsp:cNvPr id="0" name=""/>
-        <dsp:cNvSpPr/>
-      </dsp:nvSpPr>
-      <dsp:spPr>
-        <a:xfrm>
-          <a:off x="417789" y="2512146"/>
-          <a:ext cx="702497" cy="288635"/>
-        </a:xfrm>
-        <a:prstGeom prst="roundRect">
-          <a:avLst>
-            <a:gd name="adj" fmla="val 10000"/>
-          </a:avLst>
-        </a:prstGeom>
-        <a:solidFill>
-          <a:schemeClr val="bg1"/>
-        </a:solidFill>
-        <a:ln w="25400" cap="flat" cmpd="sng" algn="ctr">
-          <a:solidFill>
-            <a:schemeClr val="lt1">
-              <a:hueOff val="0"/>
-              <a:satOff val="0"/>
-              <a:lumOff val="0"/>
-              <a:alphaOff val="0"/>
-            </a:schemeClr>
-          </a:solidFill>
-          <a:prstDash val="solid"/>
-        </a:ln>
-        <a:effectLst/>
-      </dsp:spPr>
-      <dsp:style>
-        <a:lnRef idx="2">
-          <a:scrgbClr r="0" g="0" b="0"/>
-        </a:lnRef>
-        <a:fillRef idx="1">
-          <a:scrgbClr r="0" g="0" b="0"/>
-        </a:fillRef>
-        <a:effectRef idx="0">
-          <a:scrgbClr r="0" g="0" b="0"/>
-        </a:effectRef>
-        <a:fontRef idx="minor">
-          <a:schemeClr val="lt1"/>
-        </a:fontRef>
-      </dsp:style>
-      <dsp:txBody>
-        <a:bodyPr spcFirstLastPara="0" vert="horz" wrap="square" lIns="30480" tIns="30480" rIns="30480" bIns="30480" numCol="1" spcCol="1270" anchor="ctr" anchorCtr="0">
-          <a:noAutofit/>
-        </a:bodyPr>
-        <a:lstStyle/>
-        <a:p>
-          <a:pPr lvl="0" algn="ctr" defTabSz="711200">
-            <a:lnSpc>
-              <a:spcPct val="90000"/>
-            </a:lnSpc>
-            <a:spcBef>
-              <a:spcPct val="0"/>
-            </a:spcBef>
-            <a:spcAft>
-              <a:spcPct val="35000"/>
-            </a:spcAft>
-          </a:pPr>
-          <a:r>
-            <a:rPr lang="en-US" altLang="zh-CN" sz="1600" kern="1200" dirty="0" smtClean="0">
-              <a:solidFill>
-                <a:schemeClr val="tx2"/>
-              </a:solidFill>
-            </a:rPr>
-            <a:t>Board</a:t>
-          </a:r>
-        </a:p>
-      </dsp:txBody>
-      <dsp:txXfrm>
-        <a:off x="426243" y="2520600"/>
-        <a:ext cx="685589" cy="271727"/>
-      </dsp:txXfrm>
-    </dsp:sp>
-    <dsp:sp modelId="{8419F5A1-A69B-4543-A679-1CA2817D8EC5}">
-      <dsp:nvSpPr>
-        <dsp:cNvPr id="0" name=""/>
-        <dsp:cNvSpPr/>
-      </dsp:nvSpPr>
-      <dsp:spPr>
-        <a:xfrm rot="13162373">
-          <a:off x="5061404" y="1264852"/>
-          <a:ext cx="1147114" cy="432279"/>
-        </a:xfrm>
-        <a:prstGeom prst="rightArrow">
-          <a:avLst/>
-        </a:prstGeom>
-        <a:solidFill>
-          <a:schemeClr val="accent1">
-            <a:lumMod val="60000"/>
-            <a:lumOff val="40000"/>
-          </a:schemeClr>
-        </a:solidFill>
-        <a:ln>
-          <a:noFill/>
-        </a:ln>
-        <a:effectLst/>
-      </dsp:spPr>
-      <dsp:style>
-        <a:lnRef idx="0">
-          <a:scrgbClr r="0" g="0" b="0"/>
-        </a:lnRef>
-        <a:fillRef idx="1">
-          <a:scrgbClr r="0" g="0" b="0"/>
-        </a:fillRef>
-        <a:effectRef idx="0">
-          <a:scrgbClr r="0" g="0" b="0"/>
-        </a:effectRef>
-        <a:fontRef idx="minor">
-          <a:schemeClr val="lt1"/>
-        </a:fontRef>
-      </dsp:style>
-    </dsp:sp>
-    <dsp:sp modelId="{F7C0FD41-478A-46A3-B2D4-0C9B59CC473A}">
-      <dsp:nvSpPr>
-        <dsp:cNvPr id="0" name=""/>
-        <dsp:cNvSpPr/>
-      </dsp:nvSpPr>
-      <dsp:spPr>
-        <a:xfrm>
-          <a:off x="5235359" y="445721"/>
-          <a:ext cx="850019" cy="256405"/>
-        </a:xfrm>
-        <a:prstGeom prst="roundRect">
-          <a:avLst>
-            <a:gd name="adj" fmla="val 10000"/>
-          </a:avLst>
-        </a:prstGeom>
-        <a:solidFill>
-          <a:schemeClr val="bg1"/>
-        </a:solidFill>
-        <a:ln w="25400" cap="flat" cmpd="sng" algn="ctr">
-          <a:solidFill>
-            <a:schemeClr val="lt1">
-              <a:hueOff val="0"/>
-              <a:satOff val="0"/>
-              <a:lumOff val="0"/>
-              <a:alphaOff val="0"/>
-            </a:schemeClr>
-          </a:solidFill>
-          <a:prstDash val="solid"/>
-        </a:ln>
-        <a:effectLst/>
-      </dsp:spPr>
-      <dsp:style>
-        <a:lnRef idx="2">
-          <a:scrgbClr r="0" g="0" b="0"/>
-        </a:lnRef>
-        <a:fillRef idx="1">
-          <a:scrgbClr r="0" g="0" b="0"/>
-        </a:fillRef>
-        <a:effectRef idx="0">
-          <a:scrgbClr r="0" g="0" b="0"/>
-        </a:effectRef>
-        <a:fontRef idx="minor">
-          <a:schemeClr val="lt1"/>
-        </a:fontRef>
-      </dsp:style>
-      <dsp:txBody>
-        <a:bodyPr spcFirstLastPara="0" vert="horz" wrap="square" lIns="30480" tIns="30480" rIns="30480" bIns="30480" numCol="1" spcCol="1270" anchor="ctr" anchorCtr="0">
-          <a:noAutofit/>
-        </a:bodyPr>
-        <a:lstStyle/>
-        <a:p>
-          <a:pPr lvl="0" algn="ctr" defTabSz="711200">
-            <a:lnSpc>
-              <a:spcPct val="90000"/>
-            </a:lnSpc>
-            <a:spcBef>
-              <a:spcPct val="0"/>
-            </a:spcBef>
-            <a:spcAft>
-              <a:spcPct val="35000"/>
-            </a:spcAft>
-          </a:pPr>
-          <a:r>
-            <a:rPr lang="en-US" altLang="zh-CN" sz="1600" kern="1200" dirty="0" smtClean="0">
-              <a:solidFill>
-                <a:schemeClr val="tx2"/>
-              </a:solidFill>
-            </a:rPr>
-            <a:t>Mobile</a:t>
-          </a:r>
-        </a:p>
-      </dsp:txBody>
-      <dsp:txXfrm>
-        <a:off x="5242869" y="453231"/>
-        <a:ext cx="834999" cy="241385"/>
-      </dsp:txXfrm>
-    </dsp:sp>
-    <dsp:sp modelId="{BF6D7523-14F2-4E12-A4D1-F1271B8FC5D6}">
-      <dsp:nvSpPr>
-        <dsp:cNvPr id="0" name=""/>
-        <dsp:cNvSpPr/>
-      </dsp:nvSpPr>
-      <dsp:spPr>
-        <a:xfrm rot="16200000">
-          <a:off x="1154360" y="1407893"/>
-          <a:ext cx="862131" cy="432279"/>
-        </a:xfrm>
-        <a:prstGeom prst="leftArrow">
-          <a:avLst>
-            <a:gd name="adj1" fmla="val 60000"/>
-            <a:gd name="adj2" fmla="val 50000"/>
-          </a:avLst>
-        </a:prstGeom>
-        <a:solidFill>
-          <a:schemeClr val="accent1">
-            <a:lumMod val="60000"/>
-            <a:lumOff val="40000"/>
-          </a:schemeClr>
-        </a:solidFill>
-        <a:ln>
-          <a:noFill/>
-        </a:ln>
-        <a:effectLst/>
-      </dsp:spPr>
-      <dsp:style>
-        <a:lnRef idx="0">
-          <a:scrgbClr r="0" g="0" b="0"/>
-        </a:lnRef>
-        <a:fillRef idx="1">
-          <a:scrgbClr r="0" g="0" b="0"/>
-        </a:fillRef>
-        <a:effectRef idx="0">
-          <a:scrgbClr r="0" g="0" b="0"/>
-        </a:effectRef>
-        <a:fontRef idx="minor">
-          <a:schemeClr val="lt1"/>
-        </a:fontRef>
-      </dsp:style>
-    </dsp:sp>
-    <dsp:sp modelId="{D71C0E9E-C759-44C7-A943-9ED763CCF038}">
-      <dsp:nvSpPr>
-        <dsp:cNvPr id="0" name=""/>
-        <dsp:cNvSpPr/>
-      </dsp:nvSpPr>
-      <dsp:spPr>
-        <a:xfrm>
-          <a:off x="1088872" y="749286"/>
-          <a:ext cx="1208120" cy="432671"/>
-        </a:xfrm>
-        <a:prstGeom prst="roundRect">
-          <a:avLst>
-            <a:gd name="adj" fmla="val 10000"/>
-          </a:avLst>
-        </a:prstGeom>
-        <a:solidFill>
-          <a:schemeClr val="bg1"/>
-        </a:solidFill>
-        <a:ln w="25400" cap="flat" cmpd="sng" algn="ctr">
-          <a:solidFill>
-            <a:schemeClr val="lt1">
-              <a:hueOff val="0"/>
-              <a:satOff val="0"/>
-              <a:lumOff val="0"/>
-              <a:alphaOff val="0"/>
-            </a:schemeClr>
-          </a:solidFill>
-          <a:prstDash val="solid"/>
-        </a:ln>
-        <a:effectLst/>
-      </dsp:spPr>
-      <dsp:style>
-        <a:lnRef idx="2">
-          <a:scrgbClr r="0" g="0" b="0"/>
-        </a:lnRef>
-        <a:fillRef idx="1">
-          <a:scrgbClr r="0" g="0" b="0"/>
-        </a:fillRef>
-        <a:effectRef idx="0">
-          <a:scrgbClr r="0" g="0" b="0"/>
-        </a:effectRef>
-        <a:fontRef idx="minor">
-          <a:schemeClr val="lt1"/>
-        </a:fontRef>
-      </dsp:style>
-      <dsp:txBody>
-        <a:bodyPr spcFirstLastPara="0" vert="horz" wrap="square" lIns="30480" tIns="30480" rIns="30480" bIns="30480" numCol="1" spcCol="1270" anchor="ctr" anchorCtr="0">
-          <a:noAutofit/>
-        </a:bodyPr>
-        <a:lstStyle/>
-        <a:p>
-          <a:pPr lvl="0" algn="ctr" defTabSz="711200">
-            <a:lnSpc>
-              <a:spcPct val="90000"/>
-            </a:lnSpc>
-            <a:spcBef>
-              <a:spcPct val="0"/>
-            </a:spcBef>
-            <a:spcAft>
-              <a:spcPct val="35000"/>
-            </a:spcAft>
-          </a:pPr>
-          <a:r>
-            <a:rPr lang="en-US" altLang="zh-CN" sz="1600" kern="1200" dirty="0" smtClean="0">
-              <a:solidFill>
-                <a:schemeClr val="tx2"/>
-              </a:solidFill>
-            </a:rPr>
-            <a:t>Sensors</a:t>
-          </a:r>
-        </a:p>
-      </dsp:txBody>
-      <dsp:txXfrm>
-        <a:off x="1101545" y="761959"/>
-        <a:ext cx="1182774" cy="407325"/>
-      </dsp:txXfrm>
-    </dsp:sp>
   </dsp:spTree>
 </dsp:drawing>
 </file>
@@ -16369,7 +15818,7 @@
             <a:spLocks noGrp="1"/>
           </p:cNvSpPr>
           <p:nvPr>
-            <p:ph type="title"/>
+            <p:ph type="ctrTitle"/>
           </p:nvPr>
         </p:nvSpPr>
         <p:spPr/>
@@ -16379,7 +15828,7 @@
           <a:p>
             <a:r>
               <a:rPr lang="en-GB" dirty="0" smtClean="0"/>
-              <a:t>Air Quality</a:t>
+              <a:t>Enhancement</a:t>
             </a:r>
             <a:endParaRPr lang="en-GB" dirty="0"/>
           </a:p>
@@ -16387,12 +15836,12 @@
       </p:sp>
       <p:sp>
         <p:nvSpPr>
-          <p:cNvPr id="3" name="Content Placeholder 2"/>
+          <p:cNvPr id="3" name="Subtitle 2"/>
           <p:cNvSpPr>
             <a:spLocks noGrp="1"/>
           </p:cNvSpPr>
           <p:nvPr>
-            <p:ph idx="1"/>
+            <p:ph type="subTitle" idx="1"/>
           </p:nvPr>
         </p:nvSpPr>
         <p:spPr/>
@@ -16400,30 +15849,10 @@
           <a:bodyPr/>
           <a:lstStyle/>
           <a:p>
-            <a:endParaRPr lang="en-GB" dirty="0" smtClean="0"/>
-          </a:p>
-        </p:txBody>
-      </p:sp>
-      <p:sp>
-        <p:nvSpPr>
-          <p:cNvPr id="5" name="灯片编号占位符 4"/>
-          <p:cNvSpPr>
-            <a:spLocks noGrp="1"/>
-          </p:cNvSpPr>
-          <p:nvPr>
-            <p:ph type="sldNum" sz="quarter" idx="10"/>
-          </p:nvPr>
-        </p:nvSpPr>
-        <p:spPr/>
-        <p:txBody>
-          <a:bodyPr/>
-          <a:lstStyle/>
-          <a:p>
-            <a:fld id="{F7E2903A-6526-4E0B-828D-C31687035264}" type="slidenum">
-              <a:rPr lang="en-GB" smtClean="0"/>
-              <a:pPr/>
-              <a:t>19</a:t>
-            </a:fld>
+            <a:r>
+              <a:rPr lang="en-GB" dirty="0" smtClean="0"/>
+              <a:t>HHEM</a:t>
+            </a:r>
             <a:endParaRPr lang="en-GB" dirty="0"/>
           </a:p>
         </p:txBody>
@@ -16431,7 +15860,7 @@
     </p:spTree>
     <p:extLst>
       <p:ext uri="{BB962C8B-B14F-4D97-AF65-F5344CB8AC3E}">
-        <p14:creationId xmlns:p14="http://schemas.microsoft.com/office/powerpoint/2010/main" val="1107435703"/>
+        <p14:creationId xmlns:p14="http://schemas.microsoft.com/office/powerpoint/2010/main" val="643548604"/>
       </p:ext>
     </p:extLst>
   </p:cSld>
@@ -16611,41 +16040,92 @@
           <a:p>
             <a:r>
               <a:rPr lang="en-GB" dirty="0" smtClean="0"/>
-              <a:t>Scenario</a:t>
+              <a:t>Improvement &amp; Enhancement</a:t>
             </a:r>
             <a:endParaRPr lang="en-GB" dirty="0"/>
           </a:p>
         </p:txBody>
       </p:sp>
-      <p:pic>
-        <p:nvPicPr>
-          <p:cNvPr id="4" name="内容占位符 3"/>
-          <p:cNvPicPr>
-            <a:picLocks noGrp="1" noChangeAspect="1"/>
-          </p:cNvPicPr>
+      <p:sp>
+        <p:nvSpPr>
+          <p:cNvPr id="3" name="Content Placeholder 2"/>
+          <p:cNvSpPr>
+            <a:spLocks noGrp="1"/>
+          </p:cNvSpPr>
           <p:nvPr>
             <p:ph idx="1"/>
           </p:nvPr>
-        </p:nvPicPr>
-        <p:blipFill>
-          <a:blip r:embed="rId2" cstate="print">
-            <a:extLst>
-              <a:ext uri="{28A0092B-C50C-407E-A947-70E740481C1C}">
-                <a14:useLocalDpi xmlns:a14="http://schemas.microsoft.com/office/drawing/2010/main" val="0"/>
-              </a:ext>
-            </a:extLst>
-          </a:blip>
-          <a:stretch>
-            <a:fillRect/>
-          </a:stretch>
-        </p:blipFill>
-        <p:spPr>
-          <a:xfrm>
-            <a:off x="179512" y="1418376"/>
-            <a:ext cx="3672408" cy="2621986"/>
-          </a:xfrm>
-        </p:spPr>
-      </p:pic>
+        </p:nvSpPr>
+        <p:spPr/>
+        <p:txBody>
+          <a:bodyPr/>
+          <a:lstStyle/>
+          <a:p>
+            <a:r>
+              <a:rPr lang="en-GB" dirty="0" smtClean="0"/>
+              <a:t>Air Quality Sensor </a:t>
+            </a:r>
+            <a:r>
+              <a:rPr lang="en-US" altLang="zh-CN" dirty="0" smtClean="0"/>
+              <a:t>compatibility</a:t>
+            </a:r>
+          </a:p>
+          <a:p>
+            <a:r>
+              <a:rPr lang="en-US" dirty="0" smtClean="0"/>
+              <a:t>Cloud Control enhancing</a:t>
+            </a:r>
+          </a:p>
+          <a:p>
+            <a:r>
+              <a:rPr lang="en-GB" dirty="0" smtClean="0"/>
+              <a:t>P</a:t>
+            </a:r>
+            <a:r>
+              <a:rPr lang="en-US" altLang="zh-CN" dirty="0" err="1" smtClean="0"/>
+              <a:t>ower</a:t>
+            </a:r>
+            <a:r>
+              <a:rPr lang="en-US" altLang="zh-CN" dirty="0" smtClean="0"/>
+              <a:t> </a:t>
+            </a:r>
+            <a:r>
+              <a:rPr lang="en-US" altLang="zh-CN" dirty="0" smtClean="0"/>
+              <a:t>improving</a:t>
+            </a:r>
+          </a:p>
+          <a:p>
+            <a:r>
+              <a:rPr lang="en-US" dirty="0" smtClean="0"/>
+              <a:t>Multi-</a:t>
+            </a:r>
+            <a:r>
+              <a:rPr lang="en-US" dirty="0" err="1" smtClean="0"/>
+              <a:t>IoT</a:t>
+            </a:r>
+            <a:r>
+              <a:rPr lang="en-US" smtClean="0"/>
+              <a:t> </a:t>
+            </a:r>
+            <a:r>
+              <a:rPr lang="en-US"/>
+              <a:t>W</a:t>
+            </a:r>
+            <a:r>
+              <a:rPr lang="en-US" smtClean="0"/>
+              <a:t>eb </a:t>
+            </a:r>
+            <a:r>
+              <a:rPr lang="en-US" dirty="0" smtClean="0"/>
+              <a:t>supporting</a:t>
+            </a:r>
+            <a:endParaRPr lang="en-GB" dirty="0" smtClean="0"/>
+          </a:p>
+          <a:p>
+            <a:endParaRPr lang="en-GB" dirty="0" smtClean="0"/>
+          </a:p>
+        </p:txBody>
+      </p:sp>
       <p:sp>
         <p:nvSpPr>
           <p:cNvPr id="5" name="灯片编号占位符 4"/>
@@ -16665,388 +16145,6 @@
               <a:rPr lang="en-GB" smtClean="0"/>
               <a:pPr/>
               <a:t>20</a:t>
-            </a:fld>
-            <a:endParaRPr lang="en-GB" dirty="0"/>
-          </a:p>
-        </p:txBody>
-      </p:sp>
-      <p:pic>
-        <p:nvPicPr>
-          <p:cNvPr id="6" name="图片 5"/>
-          <p:cNvPicPr>
-            <a:picLocks noChangeAspect="1"/>
-          </p:cNvPicPr>
-          <p:nvPr/>
-        </p:nvPicPr>
-        <p:blipFill>
-          <a:blip r:embed="rId3" cstate="print">
-            <a:extLst>
-              <a:ext uri="{28A0092B-C50C-407E-A947-70E740481C1C}">
-                <a14:useLocalDpi xmlns:a14="http://schemas.microsoft.com/office/drawing/2010/main" val="0"/>
-              </a:ext>
-            </a:extLst>
-          </a:blip>
-          <a:stretch>
-            <a:fillRect/>
-          </a:stretch>
-        </p:blipFill>
-        <p:spPr>
-          <a:xfrm>
-            <a:off x="6300192" y="235576"/>
-            <a:ext cx="1728192" cy="2439475"/>
-          </a:xfrm>
-          <a:prstGeom prst="rect">
-            <a:avLst/>
-          </a:prstGeom>
-        </p:spPr>
-      </p:pic>
-      <p:sp>
-        <p:nvSpPr>
-          <p:cNvPr id="7" name="右箭头 6"/>
-          <p:cNvSpPr/>
-          <p:nvPr/>
-        </p:nvSpPr>
-        <p:spPr bwMode="auto">
-          <a:xfrm>
-            <a:off x="4067944" y="1851670"/>
-            <a:ext cx="1944216" cy="216024"/>
-          </a:xfrm>
-          <a:prstGeom prst="rightArrow">
-            <a:avLst/>
-          </a:prstGeom>
-          <a:solidFill>
-            <a:schemeClr val="accent1"/>
-          </a:solidFill>
-          <a:ln w="9525" cap="flat" cmpd="sng" algn="ctr">
-            <a:solidFill>
-              <a:schemeClr val="tx1"/>
-            </a:solidFill>
-            <a:prstDash val="solid"/>
-            <a:round/>
-            <a:headEnd type="none" w="med" len="med"/>
-            <a:tailEnd type="none" w="med" len="med"/>
-          </a:ln>
-          <a:effectLst/>
-        </p:spPr>
-        <p:txBody>
-          <a:bodyPr vert="horz" wrap="square" lIns="91440" tIns="45720" rIns="91440" bIns="45720" numCol="1" rtlCol="0" anchor="t" anchorCtr="0" compatLnSpc="1">
-            <a:prstTxWarp prst="textNoShape">
-              <a:avLst/>
-            </a:prstTxWarp>
-          </a:bodyPr>
-          <a:lstStyle/>
-          <a:p>
-            <a:pPr marL="0" marR="0" indent="0" algn="r" defTabSz="914400" rtl="0" eaLnBrk="1" fontAlgn="base" latinLnBrk="0" hangingPunct="1">
-              <a:lnSpc>
-                <a:spcPct val="100000"/>
-              </a:lnSpc>
-              <a:spcBef>
-                <a:spcPct val="0"/>
-              </a:spcBef>
-              <a:spcAft>
-                <a:spcPct val="0"/>
-              </a:spcAft>
-              <a:buClrTx/>
-              <a:buSzTx/>
-              <a:buFontTx/>
-              <a:buNone/>
-              <a:tabLst/>
-            </a:pPr>
-            <a:endParaRPr kumimoji="0" lang="zh-CN" altLang="en-US" sz="1600" b="0" i="0" u="none" strike="noStrike" cap="none" normalizeH="0" baseline="0" smtClean="0">
-              <a:ln>
-                <a:noFill/>
-              </a:ln>
-              <a:solidFill>
-                <a:schemeClr val="tx1"/>
-              </a:solidFill>
-              <a:effectLst/>
-              <a:latin typeface="Arial" charset="0"/>
-            </a:endParaRPr>
-          </a:p>
-        </p:txBody>
-      </p:sp>
-      <p:sp>
-        <p:nvSpPr>
-          <p:cNvPr id="8" name="左箭头 7"/>
-          <p:cNvSpPr/>
-          <p:nvPr/>
-        </p:nvSpPr>
-        <p:spPr bwMode="auto">
-          <a:xfrm>
-            <a:off x="4067944" y="3147814"/>
-            <a:ext cx="1944216" cy="216024"/>
-          </a:xfrm>
-          <a:prstGeom prst="leftArrow">
-            <a:avLst/>
-          </a:prstGeom>
-          <a:solidFill>
-            <a:schemeClr val="accent1"/>
-          </a:solidFill>
-          <a:ln w="9525" cap="flat" cmpd="sng" algn="ctr">
-            <a:solidFill>
-              <a:schemeClr val="tx1"/>
-            </a:solidFill>
-            <a:prstDash val="solid"/>
-            <a:round/>
-            <a:headEnd type="none" w="med" len="med"/>
-            <a:tailEnd type="none" w="med" len="med"/>
-          </a:ln>
-          <a:effectLst/>
-        </p:spPr>
-        <p:txBody>
-          <a:bodyPr vert="horz" wrap="square" lIns="91440" tIns="45720" rIns="91440" bIns="45720" numCol="1" rtlCol="0" anchor="t" anchorCtr="0" compatLnSpc="1">
-            <a:prstTxWarp prst="textNoShape">
-              <a:avLst/>
-            </a:prstTxWarp>
-          </a:bodyPr>
-          <a:lstStyle/>
-          <a:p>
-            <a:pPr marL="0" marR="0" indent="0" algn="r" defTabSz="914400" rtl="0" eaLnBrk="1" fontAlgn="base" latinLnBrk="0" hangingPunct="1">
-              <a:lnSpc>
-                <a:spcPct val="100000"/>
-              </a:lnSpc>
-              <a:spcBef>
-                <a:spcPct val="0"/>
-              </a:spcBef>
-              <a:spcAft>
-                <a:spcPct val="0"/>
-              </a:spcAft>
-              <a:buClrTx/>
-              <a:buSzTx/>
-              <a:buFontTx/>
-              <a:buNone/>
-              <a:tabLst/>
-            </a:pPr>
-            <a:endParaRPr kumimoji="0" lang="zh-CN" altLang="en-US" sz="1600" b="0" i="0" u="none" strike="noStrike" cap="none" normalizeH="0" baseline="0" smtClean="0">
-              <a:ln>
-                <a:noFill/>
-              </a:ln>
-              <a:solidFill>
-                <a:schemeClr val="tx1"/>
-              </a:solidFill>
-              <a:effectLst/>
-              <a:latin typeface="Arial" charset="0"/>
-            </a:endParaRPr>
-          </a:p>
-        </p:txBody>
-      </p:sp>
-      <p:pic>
-        <p:nvPicPr>
-          <p:cNvPr id="10" name="图片 9"/>
-          <p:cNvPicPr>
-            <a:picLocks noChangeAspect="1"/>
-          </p:cNvPicPr>
-          <p:nvPr/>
-        </p:nvPicPr>
-        <p:blipFill>
-          <a:blip r:embed="rId4" cstate="print">
-            <a:extLst>
-              <a:ext uri="{28A0092B-C50C-407E-A947-70E740481C1C}">
-                <a14:useLocalDpi xmlns:a14="http://schemas.microsoft.com/office/drawing/2010/main" val="0"/>
-              </a:ext>
-            </a:extLst>
-          </a:blip>
-          <a:stretch>
-            <a:fillRect/>
-          </a:stretch>
-        </p:blipFill>
-        <p:spPr>
-          <a:xfrm>
-            <a:off x="6192180" y="2931790"/>
-            <a:ext cx="2232248" cy="1335533"/>
-          </a:xfrm>
-          <a:prstGeom prst="rect">
-            <a:avLst/>
-          </a:prstGeom>
-        </p:spPr>
-      </p:pic>
-    </p:spTree>
-    <p:extLst>
-      <p:ext uri="{BB962C8B-B14F-4D97-AF65-F5344CB8AC3E}">
-        <p14:creationId xmlns:p14="http://schemas.microsoft.com/office/powerpoint/2010/main" val="3277749795"/>
-      </p:ext>
-    </p:extLst>
-  </p:cSld>
-  <p:clrMapOvr>
-    <a:masterClrMapping/>
-  </p:clrMapOvr>
-  <p:timing>
-    <p:tnLst>
-      <p:par>
-        <p:cTn id="1" dur="indefinite" restart="never" nodeType="tmRoot"/>
-      </p:par>
-    </p:tnLst>
-  </p:timing>
-</p:sld>
-</file>
-
-<file path=ppt/slides/slide21.xml><?xml version="1.0" encoding="utf-8"?>
-<p:sld xmlns:a="http://schemas.openxmlformats.org/drawingml/2006/main" xmlns:r="http://schemas.openxmlformats.org/officeDocument/2006/relationships" xmlns:p="http://schemas.openxmlformats.org/presentationml/2006/main">
-  <p:cSld>
-    <p:spTree>
-      <p:nvGrpSpPr>
-        <p:cNvPr id="1" name=""/>
-        <p:cNvGrpSpPr/>
-        <p:nvPr/>
-      </p:nvGrpSpPr>
-      <p:grpSpPr>
-        <a:xfrm>
-          <a:off x="0" y="0"/>
-          <a:ext cx="0" cy="0"/>
-          <a:chOff x="0" y="0"/>
-          <a:chExt cx="0" cy="0"/>
-        </a:xfrm>
-      </p:grpSpPr>
-      <p:sp>
-        <p:nvSpPr>
-          <p:cNvPr id="2" name="Title 1"/>
-          <p:cNvSpPr>
-            <a:spLocks noGrp="1"/>
-          </p:cNvSpPr>
-          <p:nvPr>
-            <p:ph type="ctrTitle"/>
-          </p:nvPr>
-        </p:nvSpPr>
-        <p:spPr/>
-        <p:txBody>
-          <a:bodyPr/>
-          <a:lstStyle/>
-          <a:p>
-            <a:r>
-              <a:rPr lang="en-GB" dirty="0" smtClean="0"/>
-              <a:t>Enhancement</a:t>
-            </a:r>
-            <a:endParaRPr lang="en-GB" dirty="0"/>
-          </a:p>
-        </p:txBody>
-      </p:sp>
-      <p:sp>
-        <p:nvSpPr>
-          <p:cNvPr id="3" name="Subtitle 2"/>
-          <p:cNvSpPr>
-            <a:spLocks noGrp="1"/>
-          </p:cNvSpPr>
-          <p:nvPr>
-            <p:ph type="subTitle" idx="1"/>
-          </p:nvPr>
-        </p:nvSpPr>
-        <p:spPr/>
-        <p:txBody>
-          <a:bodyPr/>
-          <a:lstStyle/>
-          <a:p>
-            <a:r>
-              <a:rPr lang="en-GB" dirty="0" smtClean="0"/>
-              <a:t>HHEM</a:t>
-            </a:r>
-            <a:endParaRPr lang="en-GB" dirty="0"/>
-          </a:p>
-        </p:txBody>
-      </p:sp>
-    </p:spTree>
-    <p:extLst>
-      <p:ext uri="{BB962C8B-B14F-4D97-AF65-F5344CB8AC3E}">
-        <p14:creationId xmlns:p14="http://schemas.microsoft.com/office/powerpoint/2010/main" val="643548604"/>
-      </p:ext>
-    </p:extLst>
-  </p:cSld>
-  <p:clrMapOvr>
-    <a:masterClrMapping/>
-  </p:clrMapOvr>
-  <p:timing>
-    <p:tnLst>
-      <p:par>
-        <p:cTn id="1" dur="indefinite" restart="never" nodeType="tmRoot"/>
-      </p:par>
-    </p:tnLst>
-  </p:timing>
-</p:sld>
-</file>
-
-<file path=ppt/slides/slide22.xml><?xml version="1.0" encoding="utf-8"?>
-<p:sld xmlns:a="http://schemas.openxmlformats.org/drawingml/2006/main" xmlns:r="http://schemas.openxmlformats.org/officeDocument/2006/relationships" xmlns:p="http://schemas.openxmlformats.org/presentationml/2006/main">
-  <p:cSld>
-    <p:spTree>
-      <p:nvGrpSpPr>
-        <p:cNvPr id="1" name=""/>
-        <p:cNvGrpSpPr/>
-        <p:nvPr/>
-      </p:nvGrpSpPr>
-      <p:grpSpPr>
-        <a:xfrm>
-          <a:off x="0" y="0"/>
-          <a:ext cx="0" cy="0"/>
-          <a:chOff x="0" y="0"/>
-          <a:chExt cx="0" cy="0"/>
-        </a:xfrm>
-      </p:grpSpPr>
-      <p:sp>
-        <p:nvSpPr>
-          <p:cNvPr id="2" name="Title 1"/>
-          <p:cNvSpPr>
-            <a:spLocks noGrp="1"/>
-          </p:cNvSpPr>
-          <p:nvPr>
-            <p:ph type="title"/>
-          </p:nvPr>
-        </p:nvSpPr>
-        <p:spPr/>
-        <p:txBody>
-          <a:bodyPr/>
-          <a:lstStyle/>
-          <a:p>
-            <a:r>
-              <a:rPr lang="en-GB" dirty="0" smtClean="0"/>
-              <a:t>Proposal</a:t>
-            </a:r>
-            <a:endParaRPr lang="en-GB" dirty="0"/>
-          </a:p>
-        </p:txBody>
-      </p:sp>
-      <p:sp>
-        <p:nvSpPr>
-          <p:cNvPr id="3" name="Content Placeholder 2"/>
-          <p:cNvSpPr>
-            <a:spLocks noGrp="1"/>
-          </p:cNvSpPr>
-          <p:nvPr>
-            <p:ph idx="1"/>
-          </p:nvPr>
-        </p:nvSpPr>
-        <p:spPr/>
-        <p:txBody>
-          <a:bodyPr/>
-          <a:lstStyle/>
-          <a:p>
-            <a:r>
-              <a:rPr lang="en-GB" dirty="0" smtClean="0"/>
-              <a:t>Human Detecting</a:t>
-            </a:r>
-          </a:p>
-          <a:p>
-            <a:endParaRPr lang="en-GB" dirty="0" smtClean="0"/>
-          </a:p>
-        </p:txBody>
-      </p:sp>
-      <p:sp>
-        <p:nvSpPr>
-          <p:cNvPr id="5" name="灯片编号占位符 4"/>
-          <p:cNvSpPr>
-            <a:spLocks noGrp="1"/>
-          </p:cNvSpPr>
-          <p:nvPr>
-            <p:ph type="sldNum" sz="quarter" idx="10"/>
-          </p:nvPr>
-        </p:nvSpPr>
-        <p:spPr/>
-        <p:txBody>
-          <a:bodyPr/>
-          <a:lstStyle/>
-          <a:p>
-            <a:fld id="{F7E2903A-6526-4E0B-828D-C31687035264}" type="slidenum">
-              <a:rPr lang="en-GB" smtClean="0"/>
-              <a:pPr/>
-              <a:t>22</a:t>
             </a:fld>
             <a:endParaRPr lang="en-GB" dirty="0"/>
           </a:p>
@@ -17072,125 +16170,7 @@
 </p:sld>
 </file>
 
-<file path=ppt/slides/slide23.xml><?xml version="1.0" encoding="utf-8"?>
-<p:sld xmlns:a="http://schemas.openxmlformats.org/drawingml/2006/main" xmlns:r="http://schemas.openxmlformats.org/officeDocument/2006/relationships" xmlns:p="http://schemas.openxmlformats.org/presentationml/2006/main">
-  <p:cSld>
-    <p:spTree>
-      <p:nvGrpSpPr>
-        <p:cNvPr id="1" name=""/>
-        <p:cNvGrpSpPr/>
-        <p:nvPr/>
-      </p:nvGrpSpPr>
-      <p:grpSpPr>
-        <a:xfrm>
-          <a:off x="0" y="0"/>
-          <a:ext cx="0" cy="0"/>
-          <a:chOff x="0" y="0"/>
-          <a:chExt cx="0" cy="0"/>
-        </a:xfrm>
-      </p:grpSpPr>
-      <p:sp>
-        <p:nvSpPr>
-          <p:cNvPr id="2" name="Title 1"/>
-          <p:cNvSpPr>
-            <a:spLocks noGrp="1"/>
-          </p:cNvSpPr>
-          <p:nvPr>
-            <p:ph type="title"/>
-          </p:nvPr>
-        </p:nvSpPr>
-        <p:spPr/>
-        <p:txBody>
-          <a:bodyPr/>
-          <a:lstStyle/>
-          <a:p>
-            <a:endParaRPr lang="en-GB"/>
-          </a:p>
-        </p:txBody>
-      </p:sp>
-      <p:sp>
-        <p:nvSpPr>
-          <p:cNvPr id="3" name="Content Placeholder 2"/>
-          <p:cNvSpPr>
-            <a:spLocks noGrp="1"/>
-          </p:cNvSpPr>
-          <p:nvPr>
-            <p:ph sz="half" idx="1"/>
-          </p:nvPr>
-        </p:nvSpPr>
-        <p:spPr/>
-        <p:txBody>
-          <a:bodyPr/>
-          <a:lstStyle/>
-          <a:p>
-            <a:endParaRPr lang="en-GB" dirty="0"/>
-          </a:p>
-        </p:txBody>
-      </p:sp>
-      <p:sp>
-        <p:nvSpPr>
-          <p:cNvPr id="4" name="Content Placeholder 3"/>
-          <p:cNvSpPr>
-            <a:spLocks noGrp="1"/>
-          </p:cNvSpPr>
-          <p:nvPr>
-            <p:ph sz="half" idx="2"/>
-          </p:nvPr>
-        </p:nvSpPr>
-        <p:spPr/>
-        <p:txBody>
-          <a:bodyPr/>
-          <a:lstStyle/>
-          <a:p>
-            <a:endParaRPr lang="en-GB" dirty="0"/>
-          </a:p>
-        </p:txBody>
-      </p:sp>
-      <p:sp>
-        <p:nvSpPr>
-          <p:cNvPr id="6" name="灯片编号占位符 5"/>
-          <p:cNvSpPr>
-            <a:spLocks noGrp="1"/>
-          </p:cNvSpPr>
-          <p:nvPr>
-            <p:ph type="sldNum" sz="quarter" idx="10"/>
-          </p:nvPr>
-        </p:nvSpPr>
-        <p:spPr/>
-        <p:txBody>
-          <a:bodyPr/>
-          <a:lstStyle/>
-          <a:p>
-            <a:fld id="{F7E2903A-6526-4E0B-828D-C31687035264}" type="slidenum">
-              <a:rPr lang="en-GB" smtClean="0"/>
-              <a:pPr/>
-              <a:t>23</a:t>
-            </a:fld>
-            <a:endParaRPr lang="en-GB" dirty="0"/>
-          </a:p>
-        </p:txBody>
-      </p:sp>
-    </p:spTree>
-    <p:extLst>
-      <p:ext uri="{BB962C8B-B14F-4D97-AF65-F5344CB8AC3E}">
-        <p14:creationId xmlns:p14="http://schemas.microsoft.com/office/powerpoint/2010/main" val="2471984264"/>
-      </p:ext>
-    </p:extLst>
-  </p:cSld>
-  <p:clrMapOvr>
-    <a:masterClrMapping/>
-  </p:clrMapOvr>
-  <p:timing>
-    <p:tnLst>
-      <p:par>
-        <p:cTn id="1" dur="indefinite" restart="never" nodeType="tmRoot"/>
-      </p:par>
-    </p:tnLst>
-  </p:timing>
-</p:sld>
-</file>
-
-<file path=ppt/slides/slide24.xml><?xml version="1.0" encoding="utf-8"?>
+<file path=ppt/slides/slide21.xml><?xml version="1.0" encoding="utf-8"?>
 <p:sld xmlns:a="http://schemas.openxmlformats.org/drawingml/2006/main" xmlns:r="http://schemas.openxmlformats.org/officeDocument/2006/relationships" xmlns:p="http://schemas.openxmlformats.org/presentationml/2006/main">
   <p:cSld>
     <p:spTree>
@@ -17622,13 +16602,11 @@
           <a:p>
             <a:r>
               <a:rPr lang="en-GB" dirty="0" smtClean="0"/>
-              <a:t>Air Quality Sensor</a:t>
-            </a:r>
-          </a:p>
-          <a:p>
+              <a:t>Temperature </a:t>
+            </a:r>
             <a:r>
               <a:rPr lang="en-GB" dirty="0"/>
-              <a:t>Temperature and Humidity </a:t>
+              <a:t>and Humidity </a:t>
             </a:r>
             <a:r>
               <a:rPr lang="en-GB" dirty="0" smtClean="0"/>

</xml_diff>

<commit_message>
add team member photo.
</commit_message>
<xml_diff>
--- a/hand-held_environment_monitor_Template.pptx
+++ b/hand-held_environment_monitor_Template.pptx
@@ -8,10 +8,10 @@
     <p:sldMasterId id="2147483699" r:id="rId4"/>
   </p:sldMasterIdLst>
   <p:notesMasterIdLst>
-    <p:notesMasterId r:id="rId26"/>
+    <p:notesMasterId r:id="rId28"/>
   </p:notesMasterIdLst>
   <p:handoutMasterIdLst>
-    <p:handoutMasterId r:id="rId27"/>
+    <p:handoutMasterId r:id="rId29"/>
   </p:handoutMasterIdLst>
   <p:sldIdLst>
     <p:sldId id="256" r:id="rId5"/>
@@ -34,7 +34,9 @@
     <p:sldId id="282" r:id="rId22"/>
     <p:sldId id="276" r:id="rId23"/>
     <p:sldId id="277" r:id="rId24"/>
-    <p:sldId id="261" r:id="rId25"/>
+    <p:sldId id="288" r:id="rId25"/>
+    <p:sldId id="290" r:id="rId26"/>
+    <p:sldId id="261" r:id="rId27"/>
   </p:sldIdLst>
   <p:sldSz cx="9144000" cy="5143500" type="screen16x9"/>
   <p:notesSz cx="6858000" cy="9144000"/>
@@ -1314,21 +1316,21 @@
     </dgm:pt>
   </dgm:ptLst>
   <dgm:cxnLst>
+    <dgm:cxn modelId="{D0BF936D-B00A-4D49-80A7-103ACFB1BDFF}" type="presOf" srcId="{03CD5F60-3C9E-479B-BF5B-186B13180958}" destId="{C4D07FF7-8274-4816-A43F-F734A84E6C11}" srcOrd="0" destOrd="0" presId="urn:microsoft.com/office/officeart/2005/8/layout/radial4"/>
+    <dgm:cxn modelId="{3D5C871A-FECE-4C69-A3D5-C6A2D1E8B6F1}" srcId="{03CD5F60-3C9E-479B-BF5B-186B13180958}" destId="{F367BEBF-D9F1-4A32-9C07-AEB36DA575D5}" srcOrd="0" destOrd="0" parTransId="{D2FFD240-B44F-4996-89A5-F05AC998ADCE}" sibTransId="{457C6250-1909-4785-8E98-CB2261D8B3A2}"/>
+    <dgm:cxn modelId="{66FAC4BB-E28F-4060-A887-39937DA74540}" type="presOf" srcId="{F367BEBF-D9F1-4A32-9C07-AEB36DA575D5}" destId="{BA7B139A-1A2F-497B-9463-05040C97EBF7}" srcOrd="0" destOrd="0" presId="urn:microsoft.com/office/officeart/2005/8/layout/radial4"/>
+    <dgm:cxn modelId="{DBAA762E-B665-4B24-B675-CF0453D11D55}" type="presOf" srcId="{04FADAF6-9C01-4EB0-A40B-FDC49A2FEB2D}" destId="{D71C0E9E-C759-44C7-A943-9ED763CCF038}" srcOrd="0" destOrd="0" presId="urn:microsoft.com/office/officeart/2005/8/layout/radial4"/>
+    <dgm:cxn modelId="{AC555F4F-83F3-4136-985E-BEC2C09C3337}" type="presOf" srcId="{7F064D22-915C-4E96-A693-282E3C9907E4}" destId="{BF6D7523-14F2-4E12-A4D1-F1271B8FC5D6}" srcOrd="0" destOrd="0" presId="urn:microsoft.com/office/officeart/2005/8/layout/radial4"/>
     <dgm:cxn modelId="{6421676A-45E2-4701-ACB9-C8FD453612FD}" srcId="{F367BEBF-D9F1-4A32-9C07-AEB36DA575D5}" destId="{B51F6A52-2D75-4129-8C99-32EBEE9D862F}" srcOrd="2" destOrd="0" parTransId="{4E77BBAB-3767-4C7C-89A6-6C30CF70AF9C}" sibTransId="{04DE8F79-3FBB-411D-A065-DBDEAF47CB17}"/>
+    <dgm:cxn modelId="{474F81AE-F123-425E-883B-CBF24941EF4F}" type="presOf" srcId="{98BBC121-5C91-4DC9-B19B-3144686B63E6}" destId="{084A16DB-BBA9-446B-9E05-BA04740747E0}" srcOrd="0" destOrd="0" presId="urn:microsoft.com/office/officeart/2005/8/layout/radial4"/>
+    <dgm:cxn modelId="{71A09525-FBC3-4B7B-A958-0B75A2E8C545}" type="presOf" srcId="{4E77BBAB-3767-4C7C-89A6-6C30CF70AF9C}" destId="{8419F5A1-A69B-4543-A679-1CA2817D8EC5}" srcOrd="0" destOrd="0" presId="urn:microsoft.com/office/officeart/2005/8/layout/radial4"/>
     <dgm:cxn modelId="{714A23FF-BA44-4EB8-B483-3D5DF528D5CC}" type="presOf" srcId="{6C1B94BE-6852-4EBF-81F5-B7394C883F29}" destId="{9CADC56C-2549-413C-A4B3-D0E8F7085CB4}" srcOrd="0" destOrd="0" presId="urn:microsoft.com/office/officeart/2005/8/layout/radial4"/>
+    <dgm:cxn modelId="{73B189AC-C3C8-4555-B470-FE3EC73F6234}" type="presOf" srcId="{B51F6A52-2D75-4129-8C99-32EBEE9D862F}" destId="{F7C0FD41-478A-46A3-B2D4-0C9B59CC473A}" srcOrd="0" destOrd="0" presId="urn:microsoft.com/office/officeart/2005/8/layout/radial4"/>
+    <dgm:cxn modelId="{45957881-71CE-447A-9B20-DCE3D255123D}" srcId="{F367BEBF-D9F1-4A32-9C07-AEB36DA575D5}" destId="{2C5A8E47-5FB9-453D-B2AA-3AFEF77087B7}" srcOrd="1" destOrd="0" parTransId="{6C1B94BE-6852-4EBF-81F5-B7394C883F29}" sibTransId="{4BBDF689-549C-40D0-AD16-3103BA374954}"/>
+    <dgm:cxn modelId="{81D6FC2B-B93A-45D1-B1E1-C5FB6BAF8CEB}" type="presOf" srcId="{2C5A8E47-5FB9-453D-B2AA-3AFEF77087B7}" destId="{59491F13-2308-41AE-90B9-8F6BADDEDFF4}" srcOrd="0" destOrd="0" presId="urn:microsoft.com/office/officeart/2005/8/layout/radial4"/>
+    <dgm:cxn modelId="{E1D28859-7496-4B7C-B9C5-A111C5D06488}" type="presOf" srcId="{754C3326-FC53-4CC7-B281-CC03656AEDA6}" destId="{B5DDEEE0-788D-4A47-8981-9A3D05B4237C}" srcOrd="0" destOrd="0" presId="urn:microsoft.com/office/officeart/2005/8/layout/radial4"/>
     <dgm:cxn modelId="{AD678C62-21F8-4C32-B2EC-C81749827E50}" srcId="{F367BEBF-D9F1-4A32-9C07-AEB36DA575D5}" destId="{98BBC121-5C91-4DC9-B19B-3144686B63E6}" srcOrd="0" destOrd="0" parTransId="{754C3326-FC53-4CC7-B281-CC03656AEDA6}" sibTransId="{A0FEE6C0-3DC3-4F2F-A775-1E9E67EB8420}"/>
-    <dgm:cxn modelId="{81D6FC2B-B93A-45D1-B1E1-C5FB6BAF8CEB}" type="presOf" srcId="{2C5A8E47-5FB9-453D-B2AA-3AFEF77087B7}" destId="{59491F13-2308-41AE-90B9-8F6BADDEDFF4}" srcOrd="0" destOrd="0" presId="urn:microsoft.com/office/officeart/2005/8/layout/radial4"/>
-    <dgm:cxn modelId="{474F81AE-F123-425E-883B-CBF24941EF4F}" type="presOf" srcId="{98BBC121-5C91-4DC9-B19B-3144686B63E6}" destId="{084A16DB-BBA9-446B-9E05-BA04740747E0}" srcOrd="0" destOrd="0" presId="urn:microsoft.com/office/officeart/2005/8/layout/radial4"/>
-    <dgm:cxn modelId="{AC555F4F-83F3-4136-985E-BEC2C09C3337}" type="presOf" srcId="{7F064D22-915C-4E96-A693-282E3C9907E4}" destId="{BF6D7523-14F2-4E12-A4D1-F1271B8FC5D6}" srcOrd="0" destOrd="0" presId="urn:microsoft.com/office/officeart/2005/8/layout/radial4"/>
-    <dgm:cxn modelId="{E1D28859-7496-4B7C-B9C5-A111C5D06488}" type="presOf" srcId="{754C3326-FC53-4CC7-B281-CC03656AEDA6}" destId="{B5DDEEE0-788D-4A47-8981-9A3D05B4237C}" srcOrd="0" destOrd="0" presId="urn:microsoft.com/office/officeart/2005/8/layout/radial4"/>
-    <dgm:cxn modelId="{45957881-71CE-447A-9B20-DCE3D255123D}" srcId="{F367BEBF-D9F1-4A32-9C07-AEB36DA575D5}" destId="{2C5A8E47-5FB9-453D-B2AA-3AFEF77087B7}" srcOrd="1" destOrd="0" parTransId="{6C1B94BE-6852-4EBF-81F5-B7394C883F29}" sibTransId="{4BBDF689-549C-40D0-AD16-3103BA374954}"/>
     <dgm:cxn modelId="{52713573-B336-44B8-9DE2-CAA95CE7CA39}" srcId="{F367BEBF-D9F1-4A32-9C07-AEB36DA575D5}" destId="{04FADAF6-9C01-4EB0-A40B-FDC49A2FEB2D}" srcOrd="3" destOrd="0" parTransId="{7F064D22-915C-4E96-A693-282E3C9907E4}" sibTransId="{E706EA7B-0C28-460D-8DFA-8FD6741B10EF}"/>
-    <dgm:cxn modelId="{66FAC4BB-E28F-4060-A887-39937DA74540}" type="presOf" srcId="{F367BEBF-D9F1-4A32-9C07-AEB36DA575D5}" destId="{BA7B139A-1A2F-497B-9463-05040C97EBF7}" srcOrd="0" destOrd="0" presId="urn:microsoft.com/office/officeart/2005/8/layout/radial4"/>
-    <dgm:cxn modelId="{3D5C871A-FECE-4C69-A3D5-C6A2D1E8B6F1}" srcId="{03CD5F60-3C9E-479B-BF5B-186B13180958}" destId="{F367BEBF-D9F1-4A32-9C07-AEB36DA575D5}" srcOrd="0" destOrd="0" parTransId="{D2FFD240-B44F-4996-89A5-F05AC998ADCE}" sibTransId="{457C6250-1909-4785-8E98-CB2261D8B3A2}"/>
-    <dgm:cxn modelId="{DBAA762E-B665-4B24-B675-CF0453D11D55}" type="presOf" srcId="{04FADAF6-9C01-4EB0-A40B-FDC49A2FEB2D}" destId="{D71C0E9E-C759-44C7-A943-9ED763CCF038}" srcOrd="0" destOrd="0" presId="urn:microsoft.com/office/officeart/2005/8/layout/radial4"/>
-    <dgm:cxn modelId="{73B189AC-C3C8-4555-B470-FE3EC73F6234}" type="presOf" srcId="{B51F6A52-2D75-4129-8C99-32EBEE9D862F}" destId="{F7C0FD41-478A-46A3-B2D4-0C9B59CC473A}" srcOrd="0" destOrd="0" presId="urn:microsoft.com/office/officeart/2005/8/layout/radial4"/>
-    <dgm:cxn modelId="{D0BF936D-B00A-4D49-80A7-103ACFB1BDFF}" type="presOf" srcId="{03CD5F60-3C9E-479B-BF5B-186B13180958}" destId="{C4D07FF7-8274-4816-A43F-F734A84E6C11}" srcOrd="0" destOrd="0" presId="urn:microsoft.com/office/officeart/2005/8/layout/radial4"/>
-    <dgm:cxn modelId="{71A09525-FBC3-4B7B-A958-0B75A2E8C545}" type="presOf" srcId="{4E77BBAB-3767-4C7C-89A6-6C30CF70AF9C}" destId="{8419F5A1-A69B-4543-A679-1CA2817D8EC5}" srcOrd="0" destOrd="0" presId="urn:microsoft.com/office/officeart/2005/8/layout/radial4"/>
     <dgm:cxn modelId="{EFD6AB27-83C2-430E-B837-B60711DC63D7}" type="presParOf" srcId="{C4D07FF7-8274-4816-A43F-F734A84E6C11}" destId="{BA7B139A-1A2F-497B-9463-05040C97EBF7}" srcOrd="0" destOrd="0" presId="urn:microsoft.com/office/officeart/2005/8/layout/radial4"/>
     <dgm:cxn modelId="{4B33CC13-B806-4C88-B6B8-6B0AF0E79676}" type="presParOf" srcId="{C4D07FF7-8274-4816-A43F-F734A84E6C11}" destId="{B5DDEEE0-788D-4A47-8981-9A3D05B4237C}" srcOrd="1" destOrd="0" presId="urn:microsoft.com/office/officeart/2005/8/layout/radial4"/>
     <dgm:cxn modelId="{974C750A-6B06-4B24-83B3-73119DC3BCBF}" type="presParOf" srcId="{C4D07FF7-8274-4816-A43F-F734A84E6C11}" destId="{084A16DB-BBA9-446B-9E05-BA04740747E0}" srcOrd="2" destOrd="0" presId="urn:microsoft.com/office/officeart/2005/8/layout/radial4"/>
@@ -1357,554 +1359,6 @@
       <dsp:cNvGrpSpPr/>
     </dsp:nvGrpSpPr>
     <dsp:grpSpPr/>
-    <dsp:sp modelId="{BA7B139A-1A2F-497B-9463-05040C97EBF7}">
-      <dsp:nvSpPr>
-        <dsp:cNvPr id="0" name=""/>
-        <dsp:cNvSpPr/>
-      </dsp:nvSpPr>
-      <dsp:spPr>
-        <a:xfrm>
-          <a:off x="5563941" y="2526744"/>
-          <a:ext cx="1873286" cy="364661"/>
-        </a:xfrm>
-        <a:prstGeom prst="ellipse">
-          <a:avLst/>
-        </a:prstGeom>
-        <a:solidFill>
-          <a:schemeClr val="bg1"/>
-        </a:solidFill>
-        <a:ln w="25400" cap="flat" cmpd="sng" algn="ctr">
-          <a:solidFill>
-            <a:schemeClr val="lt1">
-              <a:hueOff val="0"/>
-              <a:satOff val="0"/>
-              <a:lumOff val="0"/>
-              <a:alphaOff val="0"/>
-            </a:schemeClr>
-          </a:solidFill>
-          <a:prstDash val="solid"/>
-        </a:ln>
-        <a:effectLst/>
-      </dsp:spPr>
-      <dsp:style>
-        <a:lnRef idx="2">
-          <a:scrgbClr r="0" g="0" b="0"/>
-        </a:lnRef>
-        <a:fillRef idx="1">
-          <a:scrgbClr r="0" g="0" b="0"/>
-        </a:fillRef>
-        <a:effectRef idx="0">
-          <a:scrgbClr r="0" g="0" b="0"/>
-        </a:effectRef>
-        <a:fontRef idx="minor">
-          <a:schemeClr val="lt1"/>
-        </a:fontRef>
-      </dsp:style>
-      <dsp:txBody>
-        <a:bodyPr spcFirstLastPara="0" vert="horz" wrap="square" lIns="10160" tIns="10160" rIns="10160" bIns="10160" numCol="1" spcCol="1270" anchor="ctr" anchorCtr="0">
-          <a:noAutofit/>
-        </a:bodyPr>
-        <a:lstStyle/>
-        <a:p>
-          <a:pPr lvl="0" algn="ctr" defTabSz="711200">
-            <a:lnSpc>
-              <a:spcPct val="90000"/>
-            </a:lnSpc>
-            <a:spcBef>
-              <a:spcPct val="0"/>
-            </a:spcBef>
-            <a:spcAft>
-              <a:spcPct val="35000"/>
-            </a:spcAft>
-          </a:pPr>
-          <a:r>
-            <a:rPr lang="en-US" altLang="zh-CN" sz="1600" kern="1200" dirty="0" smtClean="0">
-              <a:solidFill>
-                <a:schemeClr val="tx2"/>
-              </a:solidFill>
-            </a:rPr>
-            <a:t>Cloud Server</a:t>
-          </a:r>
-        </a:p>
-      </dsp:txBody>
-      <dsp:txXfrm>
-        <a:off x="5838277" y="2580147"/>
-        <a:ext cx="1324614" cy="257855"/>
-      </dsp:txXfrm>
-    </dsp:sp>
-    <dsp:sp modelId="{B5DDEEE0-788D-4A47-8981-9A3D05B4237C}">
-      <dsp:nvSpPr>
-        <dsp:cNvPr id="0" name=""/>
-        <dsp:cNvSpPr/>
-      </dsp:nvSpPr>
-      <dsp:spPr>
-        <a:xfrm rot="10800000">
-          <a:off x="5002930" y="2403048"/>
-          <a:ext cx="714507" cy="432279"/>
-        </a:xfrm>
-        <a:prstGeom prst="leftArrow">
-          <a:avLst>
-            <a:gd name="adj1" fmla="val 60000"/>
-            <a:gd name="adj2" fmla="val 50000"/>
-          </a:avLst>
-        </a:prstGeom>
-        <a:solidFill>
-          <a:schemeClr val="accent1">
-            <a:lumMod val="60000"/>
-            <a:lumOff val="40000"/>
-          </a:schemeClr>
-        </a:solidFill>
-        <a:ln>
-          <a:noFill/>
-        </a:ln>
-        <a:effectLst/>
-      </dsp:spPr>
-      <dsp:style>
-        <a:lnRef idx="0">
-          <a:scrgbClr r="0" g="0" b="0"/>
-        </a:lnRef>
-        <a:fillRef idx="1">
-          <a:scrgbClr r="0" g="0" b="0"/>
-        </a:fillRef>
-        <a:effectRef idx="0">
-          <a:scrgbClr r="0" g="0" b="0"/>
-        </a:effectRef>
-        <a:fontRef idx="minor">
-          <a:schemeClr val="lt1"/>
-        </a:fontRef>
-      </dsp:style>
-    </dsp:sp>
-    <dsp:sp modelId="{084A16DB-BBA9-446B-9E05-BA04740747E0}">
-      <dsp:nvSpPr>
-        <dsp:cNvPr id="0" name=""/>
-        <dsp:cNvSpPr/>
-      </dsp:nvSpPr>
-      <dsp:spPr>
-        <a:xfrm>
-          <a:off x="3456631" y="2440134"/>
-          <a:ext cx="1440931" cy="396682"/>
-        </a:xfrm>
-        <a:prstGeom prst="roundRect">
-          <a:avLst>
-            <a:gd name="adj" fmla="val 10000"/>
-          </a:avLst>
-        </a:prstGeom>
-        <a:solidFill>
-          <a:schemeClr val="bg1"/>
-        </a:solidFill>
-        <a:ln w="25400" cap="flat" cmpd="sng" algn="ctr">
-          <a:solidFill>
-            <a:schemeClr val="lt1">
-              <a:hueOff val="0"/>
-              <a:satOff val="0"/>
-              <a:lumOff val="0"/>
-              <a:alphaOff val="0"/>
-            </a:schemeClr>
-          </a:solidFill>
-          <a:prstDash val="solid"/>
-        </a:ln>
-        <a:effectLst/>
-      </dsp:spPr>
-      <dsp:style>
-        <a:lnRef idx="2">
-          <a:scrgbClr r="0" g="0" b="0"/>
-        </a:lnRef>
-        <a:fillRef idx="1">
-          <a:scrgbClr r="0" g="0" b="0"/>
-        </a:fillRef>
-        <a:effectRef idx="0">
-          <a:scrgbClr r="0" g="0" b="0"/>
-        </a:effectRef>
-        <a:fontRef idx="minor">
-          <a:schemeClr val="lt1"/>
-        </a:fontRef>
-      </dsp:style>
-      <dsp:txBody>
-        <a:bodyPr spcFirstLastPara="0" vert="horz" wrap="square" lIns="30480" tIns="30480" rIns="30480" bIns="30480" numCol="1" spcCol="1270" anchor="ctr" anchorCtr="0">
-          <a:noAutofit/>
-        </a:bodyPr>
-        <a:lstStyle/>
-        <a:p>
-          <a:pPr lvl="0" algn="ctr" defTabSz="711200">
-            <a:lnSpc>
-              <a:spcPct val="90000"/>
-            </a:lnSpc>
-            <a:spcBef>
-              <a:spcPct val="0"/>
-            </a:spcBef>
-            <a:spcAft>
-              <a:spcPct val="35000"/>
-            </a:spcAft>
-          </a:pPr>
-          <a:r>
-            <a:rPr lang="en-US" altLang="zh-CN" sz="1600" kern="1200" dirty="0" smtClean="0">
-              <a:solidFill>
-                <a:schemeClr val="tx2"/>
-              </a:solidFill>
-            </a:rPr>
-            <a:t>Yun Shield</a:t>
-          </a:r>
-        </a:p>
-      </dsp:txBody>
-      <dsp:txXfrm>
-        <a:off x="3468249" y="2451752"/>
-        <a:ext cx="1417695" cy="373446"/>
-      </dsp:txXfrm>
-    </dsp:sp>
-    <dsp:sp modelId="{9CADC56C-2549-413C-A4B3-D0E8F7085CB4}">
-      <dsp:nvSpPr>
-        <dsp:cNvPr id="0" name=""/>
-        <dsp:cNvSpPr/>
-      </dsp:nvSpPr>
-      <dsp:spPr>
-        <a:xfrm rot="10855017">
-          <a:off x="2551518" y="2370748"/>
-          <a:ext cx="745935" cy="432279"/>
-        </a:xfrm>
-        <a:prstGeom prst="leftArrow">
-          <a:avLst>
-            <a:gd name="adj1" fmla="val 60000"/>
-            <a:gd name="adj2" fmla="val 50000"/>
-          </a:avLst>
-        </a:prstGeom>
-        <a:solidFill>
-          <a:schemeClr val="accent1">
-            <a:lumMod val="60000"/>
-            <a:lumOff val="40000"/>
-          </a:schemeClr>
-        </a:solidFill>
-        <a:ln>
-          <a:noFill/>
-        </a:ln>
-        <a:effectLst/>
-      </dsp:spPr>
-      <dsp:style>
-        <a:lnRef idx="0">
-          <a:scrgbClr r="0" g="0" b="0"/>
-        </a:lnRef>
-        <a:fillRef idx="1">
-          <a:scrgbClr r="0" g="0" b="0"/>
-        </a:fillRef>
-        <a:effectRef idx="0">
-          <a:scrgbClr r="0" g="0" b="0"/>
-        </a:effectRef>
-        <a:fontRef idx="minor">
-          <a:schemeClr val="lt1"/>
-        </a:fontRef>
-      </dsp:style>
-    </dsp:sp>
-    <dsp:sp modelId="{59491F13-2308-41AE-90B9-8F6BADDEDFF4}">
-      <dsp:nvSpPr>
-        <dsp:cNvPr id="0" name=""/>
-        <dsp:cNvSpPr/>
-      </dsp:nvSpPr>
-      <dsp:spPr>
-        <a:xfrm>
-          <a:off x="417789" y="2512146"/>
-          <a:ext cx="702497" cy="288635"/>
-        </a:xfrm>
-        <a:prstGeom prst="roundRect">
-          <a:avLst>
-            <a:gd name="adj" fmla="val 10000"/>
-          </a:avLst>
-        </a:prstGeom>
-        <a:solidFill>
-          <a:schemeClr val="bg1"/>
-        </a:solidFill>
-        <a:ln w="25400" cap="flat" cmpd="sng" algn="ctr">
-          <a:solidFill>
-            <a:schemeClr val="lt1">
-              <a:hueOff val="0"/>
-              <a:satOff val="0"/>
-              <a:lumOff val="0"/>
-              <a:alphaOff val="0"/>
-            </a:schemeClr>
-          </a:solidFill>
-          <a:prstDash val="solid"/>
-        </a:ln>
-        <a:effectLst/>
-      </dsp:spPr>
-      <dsp:style>
-        <a:lnRef idx="2">
-          <a:scrgbClr r="0" g="0" b="0"/>
-        </a:lnRef>
-        <a:fillRef idx="1">
-          <a:scrgbClr r="0" g="0" b="0"/>
-        </a:fillRef>
-        <a:effectRef idx="0">
-          <a:scrgbClr r="0" g="0" b="0"/>
-        </a:effectRef>
-        <a:fontRef idx="minor">
-          <a:schemeClr val="lt1"/>
-        </a:fontRef>
-      </dsp:style>
-      <dsp:txBody>
-        <a:bodyPr spcFirstLastPara="0" vert="horz" wrap="square" lIns="30480" tIns="30480" rIns="30480" bIns="30480" numCol="1" spcCol="1270" anchor="ctr" anchorCtr="0">
-          <a:noAutofit/>
-        </a:bodyPr>
-        <a:lstStyle/>
-        <a:p>
-          <a:pPr lvl="0" algn="ctr" defTabSz="711200">
-            <a:lnSpc>
-              <a:spcPct val="90000"/>
-            </a:lnSpc>
-            <a:spcBef>
-              <a:spcPct val="0"/>
-            </a:spcBef>
-            <a:spcAft>
-              <a:spcPct val="35000"/>
-            </a:spcAft>
-          </a:pPr>
-          <a:r>
-            <a:rPr lang="en-US" altLang="zh-CN" sz="1600" kern="1200" dirty="0" smtClean="0">
-              <a:solidFill>
-                <a:schemeClr val="tx2"/>
-              </a:solidFill>
-            </a:rPr>
-            <a:t>Board</a:t>
-          </a:r>
-        </a:p>
-      </dsp:txBody>
-      <dsp:txXfrm>
-        <a:off x="426243" y="2520600"/>
-        <a:ext cx="685589" cy="271727"/>
-      </dsp:txXfrm>
-    </dsp:sp>
-    <dsp:sp modelId="{8419F5A1-A69B-4543-A679-1CA2817D8EC5}">
-      <dsp:nvSpPr>
-        <dsp:cNvPr id="0" name=""/>
-        <dsp:cNvSpPr/>
-      </dsp:nvSpPr>
-      <dsp:spPr>
-        <a:xfrm rot="13162373">
-          <a:off x="5061404" y="1264852"/>
-          <a:ext cx="1147114" cy="432279"/>
-        </a:xfrm>
-        <a:prstGeom prst="rightArrow">
-          <a:avLst/>
-        </a:prstGeom>
-        <a:solidFill>
-          <a:schemeClr val="accent1">
-            <a:lumMod val="60000"/>
-            <a:lumOff val="40000"/>
-          </a:schemeClr>
-        </a:solidFill>
-        <a:ln>
-          <a:noFill/>
-        </a:ln>
-        <a:effectLst/>
-      </dsp:spPr>
-      <dsp:style>
-        <a:lnRef idx="0">
-          <a:scrgbClr r="0" g="0" b="0"/>
-        </a:lnRef>
-        <a:fillRef idx="1">
-          <a:scrgbClr r="0" g="0" b="0"/>
-        </a:fillRef>
-        <a:effectRef idx="0">
-          <a:scrgbClr r="0" g="0" b="0"/>
-        </a:effectRef>
-        <a:fontRef idx="minor">
-          <a:schemeClr val="lt1"/>
-        </a:fontRef>
-      </dsp:style>
-    </dsp:sp>
-    <dsp:sp modelId="{F7C0FD41-478A-46A3-B2D4-0C9B59CC473A}">
-      <dsp:nvSpPr>
-        <dsp:cNvPr id="0" name=""/>
-        <dsp:cNvSpPr/>
-      </dsp:nvSpPr>
-      <dsp:spPr>
-        <a:xfrm>
-          <a:off x="5235359" y="445721"/>
-          <a:ext cx="850019" cy="256405"/>
-        </a:xfrm>
-        <a:prstGeom prst="roundRect">
-          <a:avLst>
-            <a:gd name="adj" fmla="val 10000"/>
-          </a:avLst>
-        </a:prstGeom>
-        <a:solidFill>
-          <a:schemeClr val="bg1"/>
-        </a:solidFill>
-        <a:ln w="25400" cap="flat" cmpd="sng" algn="ctr">
-          <a:solidFill>
-            <a:schemeClr val="lt1">
-              <a:hueOff val="0"/>
-              <a:satOff val="0"/>
-              <a:lumOff val="0"/>
-              <a:alphaOff val="0"/>
-            </a:schemeClr>
-          </a:solidFill>
-          <a:prstDash val="solid"/>
-        </a:ln>
-        <a:effectLst/>
-      </dsp:spPr>
-      <dsp:style>
-        <a:lnRef idx="2">
-          <a:scrgbClr r="0" g="0" b="0"/>
-        </a:lnRef>
-        <a:fillRef idx="1">
-          <a:scrgbClr r="0" g="0" b="0"/>
-        </a:fillRef>
-        <a:effectRef idx="0">
-          <a:scrgbClr r="0" g="0" b="0"/>
-        </a:effectRef>
-        <a:fontRef idx="minor">
-          <a:schemeClr val="lt1"/>
-        </a:fontRef>
-      </dsp:style>
-      <dsp:txBody>
-        <a:bodyPr spcFirstLastPara="0" vert="horz" wrap="square" lIns="30480" tIns="30480" rIns="30480" bIns="30480" numCol="1" spcCol="1270" anchor="ctr" anchorCtr="0">
-          <a:noAutofit/>
-        </a:bodyPr>
-        <a:lstStyle/>
-        <a:p>
-          <a:pPr lvl="0" algn="ctr" defTabSz="711200">
-            <a:lnSpc>
-              <a:spcPct val="90000"/>
-            </a:lnSpc>
-            <a:spcBef>
-              <a:spcPct val="0"/>
-            </a:spcBef>
-            <a:spcAft>
-              <a:spcPct val="35000"/>
-            </a:spcAft>
-          </a:pPr>
-          <a:r>
-            <a:rPr lang="en-US" altLang="zh-CN" sz="1600" kern="1200" dirty="0" smtClean="0">
-              <a:solidFill>
-                <a:schemeClr val="tx2"/>
-              </a:solidFill>
-            </a:rPr>
-            <a:t>Mobile</a:t>
-          </a:r>
-        </a:p>
-      </dsp:txBody>
-      <dsp:txXfrm>
-        <a:off x="5242869" y="453231"/>
-        <a:ext cx="834999" cy="241385"/>
-      </dsp:txXfrm>
-    </dsp:sp>
-    <dsp:sp modelId="{BF6D7523-14F2-4E12-A4D1-F1271B8FC5D6}">
-      <dsp:nvSpPr>
-        <dsp:cNvPr id="0" name=""/>
-        <dsp:cNvSpPr/>
-      </dsp:nvSpPr>
-      <dsp:spPr>
-        <a:xfrm rot="16200000">
-          <a:off x="1154360" y="1407893"/>
-          <a:ext cx="862131" cy="432279"/>
-        </a:xfrm>
-        <a:prstGeom prst="leftArrow">
-          <a:avLst>
-            <a:gd name="adj1" fmla="val 60000"/>
-            <a:gd name="adj2" fmla="val 50000"/>
-          </a:avLst>
-        </a:prstGeom>
-        <a:solidFill>
-          <a:schemeClr val="accent1">
-            <a:lumMod val="60000"/>
-            <a:lumOff val="40000"/>
-          </a:schemeClr>
-        </a:solidFill>
-        <a:ln>
-          <a:noFill/>
-        </a:ln>
-        <a:effectLst/>
-      </dsp:spPr>
-      <dsp:style>
-        <a:lnRef idx="0">
-          <a:scrgbClr r="0" g="0" b="0"/>
-        </a:lnRef>
-        <a:fillRef idx="1">
-          <a:scrgbClr r="0" g="0" b="0"/>
-        </a:fillRef>
-        <a:effectRef idx="0">
-          <a:scrgbClr r="0" g="0" b="0"/>
-        </a:effectRef>
-        <a:fontRef idx="minor">
-          <a:schemeClr val="lt1"/>
-        </a:fontRef>
-      </dsp:style>
-    </dsp:sp>
-    <dsp:sp modelId="{D71C0E9E-C759-44C7-A943-9ED763CCF038}">
-      <dsp:nvSpPr>
-        <dsp:cNvPr id="0" name=""/>
-        <dsp:cNvSpPr/>
-      </dsp:nvSpPr>
-      <dsp:spPr>
-        <a:xfrm>
-          <a:off x="1088872" y="749286"/>
-          <a:ext cx="1208120" cy="432671"/>
-        </a:xfrm>
-        <a:prstGeom prst="roundRect">
-          <a:avLst>
-            <a:gd name="adj" fmla="val 10000"/>
-          </a:avLst>
-        </a:prstGeom>
-        <a:solidFill>
-          <a:schemeClr val="bg1"/>
-        </a:solidFill>
-        <a:ln w="25400" cap="flat" cmpd="sng" algn="ctr">
-          <a:solidFill>
-            <a:schemeClr val="lt1">
-              <a:hueOff val="0"/>
-              <a:satOff val="0"/>
-              <a:lumOff val="0"/>
-              <a:alphaOff val="0"/>
-            </a:schemeClr>
-          </a:solidFill>
-          <a:prstDash val="solid"/>
-        </a:ln>
-        <a:effectLst/>
-      </dsp:spPr>
-      <dsp:style>
-        <a:lnRef idx="2">
-          <a:scrgbClr r="0" g="0" b="0"/>
-        </a:lnRef>
-        <a:fillRef idx="1">
-          <a:scrgbClr r="0" g="0" b="0"/>
-        </a:fillRef>
-        <a:effectRef idx="0">
-          <a:scrgbClr r="0" g="0" b="0"/>
-        </a:effectRef>
-        <a:fontRef idx="minor">
-          <a:schemeClr val="lt1"/>
-        </a:fontRef>
-      </dsp:style>
-      <dsp:txBody>
-        <a:bodyPr spcFirstLastPara="0" vert="horz" wrap="square" lIns="30480" tIns="30480" rIns="30480" bIns="30480" numCol="1" spcCol="1270" anchor="ctr" anchorCtr="0">
-          <a:noAutofit/>
-        </a:bodyPr>
-        <a:lstStyle/>
-        <a:p>
-          <a:pPr lvl="0" algn="ctr" defTabSz="711200">
-            <a:lnSpc>
-              <a:spcPct val="90000"/>
-            </a:lnSpc>
-            <a:spcBef>
-              <a:spcPct val="0"/>
-            </a:spcBef>
-            <a:spcAft>
-              <a:spcPct val="35000"/>
-            </a:spcAft>
-          </a:pPr>
-          <a:r>
-            <a:rPr lang="en-US" altLang="zh-CN" sz="1600" kern="1200" dirty="0" smtClean="0">
-              <a:solidFill>
-                <a:schemeClr val="tx2"/>
-              </a:solidFill>
-            </a:rPr>
-            <a:t>Sensors</a:t>
-          </a:r>
-        </a:p>
-      </dsp:txBody>
-      <dsp:txXfrm>
-        <a:off x="1101545" y="761959"/>
-        <a:ext cx="1182774" cy="407325"/>
-      </dsp:txXfrm>
-    </dsp:sp>
   </dsp:spTree>
 </dsp:drawing>
 </file>
@@ -16736,8 +16190,13 @@
             </a:r>
             <a:r>
               <a:rPr lang="en-US" altLang="zh-CN" dirty="0" smtClean="0"/>
-              <a:t> improving</a:t>
-            </a:r>
+              <a:t> </a:t>
+            </a:r>
+            <a:r>
+              <a:rPr lang="en-US" altLang="zh-CN" dirty="0" smtClean="0"/>
+              <a:t>improving</a:t>
+            </a:r>
+            <a:endParaRPr lang="en-US" altLang="zh-CN" dirty="0" smtClean="0"/>
           </a:p>
           <a:p>
             <a:r>
@@ -16749,20 +16208,40 @@
               <a:t>IoT</a:t>
             </a:r>
             <a:r>
-              <a:rPr lang="en-US" smtClean="0"/>
+              <a:rPr lang="en-US" dirty="0" smtClean="0"/>
               <a:t> </a:t>
             </a:r>
             <a:r>
-              <a:rPr lang="en-US"/>
+              <a:rPr lang="en-US" dirty="0"/>
               <a:t>W</a:t>
             </a:r>
             <a:r>
-              <a:rPr lang="en-US" smtClean="0"/>
+              <a:rPr lang="en-US" dirty="0" smtClean="0"/>
               <a:t>eb </a:t>
             </a:r>
             <a:r>
               <a:rPr lang="en-US" dirty="0" smtClean="0"/>
               <a:t>supporting</a:t>
+            </a:r>
+            <a:r>
+              <a:rPr lang="zh-CN" altLang="en-US" dirty="0" smtClean="0"/>
+              <a:t>（</a:t>
+            </a:r>
+            <a:r>
+              <a:rPr lang="en-US" altLang="zh-CN" dirty="0" err="1" smtClean="0"/>
+              <a:t>e.g</a:t>
+            </a:r>
+            <a:r>
+              <a:rPr lang="en-US" altLang="zh-CN" dirty="0" smtClean="0"/>
+              <a:t>: </a:t>
+            </a:r>
+            <a:r>
+              <a:rPr lang="en-US" altLang="zh-CN" dirty="0" err="1" smtClean="0"/>
+              <a:t>Xively</a:t>
+            </a:r>
+            <a:r>
+              <a:rPr lang="zh-CN" altLang="en-US" dirty="0" smtClean="0"/>
+              <a:t>）</a:t>
             </a:r>
             <a:endParaRPr lang="en-GB" dirty="0" smtClean="0"/>
           </a:p>
@@ -16816,6 +16295,260 @@
 </file>
 
 <file path=ppt/slides/slide21.xml><?xml version="1.0" encoding="utf-8"?>
+<p:sld xmlns:a="http://schemas.openxmlformats.org/drawingml/2006/main" xmlns:r="http://schemas.openxmlformats.org/officeDocument/2006/relationships" xmlns:p="http://schemas.openxmlformats.org/presentationml/2006/main">
+  <p:cSld>
+    <p:spTree>
+      <p:nvGrpSpPr>
+        <p:cNvPr id="1" name=""/>
+        <p:cNvGrpSpPr/>
+        <p:nvPr/>
+      </p:nvGrpSpPr>
+      <p:grpSpPr>
+        <a:xfrm>
+          <a:off x="0" y="0"/>
+          <a:ext cx="0" cy="0"/>
+          <a:chOff x="0" y="0"/>
+          <a:chExt cx="0" cy="0"/>
+        </a:xfrm>
+      </p:grpSpPr>
+      <p:sp>
+        <p:nvSpPr>
+          <p:cNvPr id="2" name="Title 1"/>
+          <p:cNvSpPr>
+            <a:spLocks noGrp="1"/>
+          </p:cNvSpPr>
+          <p:nvPr>
+            <p:ph type="ctrTitle"/>
+          </p:nvPr>
+        </p:nvSpPr>
+        <p:spPr/>
+        <p:txBody>
+          <a:bodyPr/>
+          <a:lstStyle/>
+          <a:p>
+            <a:r>
+              <a:rPr lang="en-GB" dirty="0" smtClean="0"/>
+              <a:t>Team</a:t>
+            </a:r>
+            <a:endParaRPr lang="en-GB" dirty="0"/>
+          </a:p>
+        </p:txBody>
+      </p:sp>
+      <p:sp>
+        <p:nvSpPr>
+          <p:cNvPr id="3" name="Subtitle 2"/>
+          <p:cNvSpPr>
+            <a:spLocks noGrp="1"/>
+          </p:cNvSpPr>
+          <p:nvPr>
+            <p:ph type="subTitle" idx="1"/>
+          </p:nvPr>
+        </p:nvSpPr>
+        <p:spPr/>
+        <p:txBody>
+          <a:bodyPr/>
+          <a:lstStyle/>
+          <a:p>
+            <a:r>
+              <a:rPr lang="en-GB" dirty="0" smtClean="0"/>
+              <a:t>HHEM</a:t>
+            </a:r>
+            <a:endParaRPr lang="en-GB" dirty="0"/>
+          </a:p>
+        </p:txBody>
+      </p:sp>
+    </p:spTree>
+    <p:extLst>
+      <p:ext uri="{BB962C8B-B14F-4D97-AF65-F5344CB8AC3E}">
+        <p14:creationId xmlns:p14="http://schemas.microsoft.com/office/powerpoint/2010/main" val="1858024821"/>
+      </p:ext>
+    </p:extLst>
+  </p:cSld>
+  <p:clrMapOvr>
+    <a:masterClrMapping/>
+  </p:clrMapOvr>
+  <p:timing>
+    <p:tnLst>
+      <p:par>
+        <p:cTn id="1" dur="indefinite" restart="never" nodeType="tmRoot"/>
+      </p:par>
+    </p:tnLst>
+  </p:timing>
+</p:sld>
+</file>
+
+<file path=ppt/slides/slide22.xml><?xml version="1.0" encoding="utf-8"?>
+<p:sld xmlns:a="http://schemas.openxmlformats.org/drawingml/2006/main" xmlns:r="http://schemas.openxmlformats.org/officeDocument/2006/relationships" xmlns:p="http://schemas.openxmlformats.org/presentationml/2006/main">
+  <p:cSld>
+    <p:spTree>
+      <p:nvGrpSpPr>
+        <p:cNvPr id="1" name=""/>
+        <p:cNvGrpSpPr/>
+        <p:nvPr/>
+      </p:nvGrpSpPr>
+      <p:grpSpPr>
+        <a:xfrm>
+          <a:off x="0" y="0"/>
+          <a:ext cx="0" cy="0"/>
+          <a:chOff x="0" y="0"/>
+          <a:chExt cx="0" cy="0"/>
+        </a:xfrm>
+      </p:grpSpPr>
+      <p:sp>
+        <p:nvSpPr>
+          <p:cNvPr id="2" name="Title 1"/>
+          <p:cNvSpPr>
+            <a:spLocks noGrp="1"/>
+          </p:cNvSpPr>
+          <p:nvPr>
+            <p:ph type="title"/>
+          </p:nvPr>
+        </p:nvSpPr>
+        <p:spPr/>
+        <p:txBody>
+          <a:bodyPr/>
+          <a:lstStyle/>
+          <a:p>
+            <a:r>
+              <a:rPr lang="en-GB" dirty="0" smtClean="0"/>
+              <a:t>Team M</a:t>
+            </a:r>
+            <a:r>
+              <a:rPr lang="en-US" altLang="zh-CN" dirty="0" smtClean="0"/>
+              <a:t>embers</a:t>
+            </a:r>
+            <a:endParaRPr lang="en-GB" dirty="0"/>
+          </a:p>
+        </p:txBody>
+      </p:sp>
+      <p:pic>
+        <p:nvPicPr>
+          <p:cNvPr id="5" name="内容占位符 4"/>
+          <p:cNvPicPr>
+            <a:picLocks noGrp="1" noChangeAspect="1"/>
+          </p:cNvPicPr>
+          <p:nvPr>
+            <p:ph sz="half" idx="1"/>
+          </p:nvPr>
+        </p:nvPicPr>
+        <p:blipFill>
+          <a:blip r:embed="rId2">
+            <a:extLst>
+              <a:ext uri="{28A0092B-C50C-407E-A947-70E740481C1C}">
+                <a14:useLocalDpi xmlns:a14="http://schemas.microsoft.com/office/drawing/2010/main" val="0"/>
+              </a:ext>
+            </a:extLst>
+          </a:blip>
+          <a:stretch>
+            <a:fillRect/>
+          </a:stretch>
+        </p:blipFill>
+        <p:spPr>
+          <a:xfrm>
+            <a:off x="395288" y="1422868"/>
+            <a:ext cx="3732212" cy="2794651"/>
+          </a:xfrm>
+        </p:spPr>
+      </p:pic>
+      <p:sp>
+        <p:nvSpPr>
+          <p:cNvPr id="4" name="Content Placeholder 3"/>
+          <p:cNvSpPr>
+            <a:spLocks noGrp="1"/>
+          </p:cNvSpPr>
+          <p:nvPr>
+            <p:ph sz="half" idx="2"/>
+          </p:nvPr>
+        </p:nvSpPr>
+        <p:spPr/>
+        <p:txBody>
+          <a:bodyPr/>
+          <a:lstStyle/>
+          <a:p>
+            <a:r>
+              <a:rPr lang="en-GB" dirty="0" smtClean="0"/>
+              <a:t>Liu </a:t>
+            </a:r>
+            <a:r>
+              <a:rPr lang="en-GB" dirty="0" err="1" smtClean="0"/>
+              <a:t>MingYuan</a:t>
+            </a:r>
+            <a:endParaRPr lang="en-GB" dirty="0" smtClean="0"/>
+          </a:p>
+          <a:p>
+            <a:r>
+              <a:rPr lang="en-GB" dirty="0" smtClean="0"/>
+              <a:t>Hu Pan</a:t>
+            </a:r>
+          </a:p>
+          <a:p>
+            <a:r>
+              <a:rPr lang="en-GB" dirty="0" smtClean="0"/>
+              <a:t>Han </a:t>
+            </a:r>
+            <a:r>
+              <a:rPr lang="en-GB" dirty="0" err="1" smtClean="0"/>
+              <a:t>Qiankun</a:t>
+            </a:r>
+            <a:endParaRPr lang="en-GB" dirty="0" smtClean="0"/>
+          </a:p>
+          <a:p>
+            <a:r>
+              <a:rPr lang="en-GB" dirty="0" smtClean="0"/>
+              <a:t>Feng Wei</a:t>
+            </a:r>
+          </a:p>
+          <a:p>
+            <a:r>
+              <a:rPr lang="en-GB" dirty="0" smtClean="0"/>
+              <a:t>Fan </a:t>
+            </a:r>
+            <a:r>
+              <a:rPr lang="en-GB" dirty="0" err="1" smtClean="0"/>
+              <a:t>Dewei</a:t>
+            </a:r>
+            <a:endParaRPr lang="en-GB" dirty="0"/>
+          </a:p>
+        </p:txBody>
+      </p:sp>
+      <p:sp>
+        <p:nvSpPr>
+          <p:cNvPr id="6" name="灯片编号占位符 5"/>
+          <p:cNvSpPr>
+            <a:spLocks noGrp="1"/>
+          </p:cNvSpPr>
+          <p:nvPr>
+            <p:ph type="sldNum" sz="quarter" idx="10"/>
+          </p:nvPr>
+        </p:nvSpPr>
+        <p:spPr/>
+        <p:txBody>
+          <a:bodyPr/>
+          <a:lstStyle/>
+          <a:p>
+            <a:fld id="{F7E2903A-6526-4E0B-828D-C31687035264}" type="slidenum">
+              <a:rPr lang="en-GB" smtClean="0"/>
+              <a:pPr/>
+              <a:t>22</a:t>
+            </a:fld>
+            <a:endParaRPr lang="en-GB" dirty="0"/>
+          </a:p>
+        </p:txBody>
+      </p:sp>
+    </p:spTree>
+    <p:extLst>
+      <p:ext uri="{BB962C8B-B14F-4D97-AF65-F5344CB8AC3E}">
+        <p14:creationId xmlns:p14="http://schemas.microsoft.com/office/powerpoint/2010/main" val="3186849101"/>
+      </p:ext>
+    </p:extLst>
+  </p:cSld>
+  <p:clrMapOvr>
+    <a:masterClrMapping/>
+  </p:clrMapOvr>
+</p:sld>
+</file>
+
+<file path=ppt/slides/slide23.xml><?xml version="1.0" encoding="utf-8"?>
 <p:sld xmlns:a="http://schemas.openxmlformats.org/drawingml/2006/main" xmlns:r="http://schemas.openxmlformats.org/officeDocument/2006/relationships" xmlns:p="http://schemas.openxmlformats.org/presentationml/2006/main">
   <p:cSld>
     <p:spTree>

</xml_diff>